<commit_message>
añadiendo nueva version de font-awesome
</commit_message>
<xml_diff>
--- a/src/assets/Tecnologias.pptx
+++ b/src/assets/Tecnologias.pptx
@@ -16,15 +16,16 @@
     <p:sldId id="271" r:id="rId10"/>
     <p:sldId id="272" r:id="rId11"/>
     <p:sldId id="275" r:id="rId12"/>
-    <p:sldId id="264" r:id="rId13"/>
-    <p:sldId id="273" r:id="rId14"/>
-    <p:sldId id="263" r:id="rId15"/>
-    <p:sldId id="259" r:id="rId16"/>
-    <p:sldId id="261" r:id="rId17"/>
-    <p:sldId id="262" r:id="rId18"/>
-    <p:sldId id="256" r:id="rId19"/>
-    <p:sldId id="269" r:id="rId20"/>
-    <p:sldId id="270" r:id="rId21"/>
+    <p:sldId id="273" r:id="rId13"/>
+    <p:sldId id="276" r:id="rId14"/>
+    <p:sldId id="264" r:id="rId15"/>
+    <p:sldId id="263" r:id="rId16"/>
+    <p:sldId id="259" r:id="rId17"/>
+    <p:sldId id="261" r:id="rId18"/>
+    <p:sldId id="262" r:id="rId19"/>
+    <p:sldId id="256" r:id="rId20"/>
+    <p:sldId id="269" r:id="rId21"/>
+    <p:sldId id="270" r:id="rId22"/>
   </p:sldIdLst>
   <p:sldSz cx="12192000" cy="6858000"/>
   <p:notesSz cx="6858000" cy="9144000"/>
@@ -280,7 +281,7 @@
           <a:p>
             <a:fld id="{9E11D292-9858-43A2-94EF-E1E63D9E27EF}" type="datetimeFigureOut">
               <a:rPr lang="es-419" smtClean="0"/>
-              <a:t>25/7/2022</a:t>
+              <a:t>26/7/2022</a:t>
             </a:fld>
             <a:endParaRPr lang="es-419"/>
           </a:p>
@@ -480,7 +481,7 @@
           <a:p>
             <a:fld id="{9E11D292-9858-43A2-94EF-E1E63D9E27EF}" type="datetimeFigureOut">
               <a:rPr lang="es-419" smtClean="0"/>
-              <a:t>25/7/2022</a:t>
+              <a:t>26/7/2022</a:t>
             </a:fld>
             <a:endParaRPr lang="es-419"/>
           </a:p>
@@ -690,7 +691,7 @@
           <a:p>
             <a:fld id="{9E11D292-9858-43A2-94EF-E1E63D9E27EF}" type="datetimeFigureOut">
               <a:rPr lang="es-419" smtClean="0"/>
-              <a:t>25/7/2022</a:t>
+              <a:t>26/7/2022</a:t>
             </a:fld>
             <a:endParaRPr lang="es-419"/>
           </a:p>
@@ -890,7 +891,7 @@
           <a:p>
             <a:fld id="{9E11D292-9858-43A2-94EF-E1E63D9E27EF}" type="datetimeFigureOut">
               <a:rPr lang="es-419" smtClean="0"/>
-              <a:t>25/7/2022</a:t>
+              <a:t>26/7/2022</a:t>
             </a:fld>
             <a:endParaRPr lang="es-419"/>
           </a:p>
@@ -1166,7 +1167,7 @@
           <a:p>
             <a:fld id="{9E11D292-9858-43A2-94EF-E1E63D9E27EF}" type="datetimeFigureOut">
               <a:rPr lang="es-419" smtClean="0"/>
-              <a:t>25/7/2022</a:t>
+              <a:t>26/7/2022</a:t>
             </a:fld>
             <a:endParaRPr lang="es-419"/>
           </a:p>
@@ -1434,7 +1435,7 @@
           <a:p>
             <a:fld id="{9E11D292-9858-43A2-94EF-E1E63D9E27EF}" type="datetimeFigureOut">
               <a:rPr lang="es-419" smtClean="0"/>
-              <a:t>25/7/2022</a:t>
+              <a:t>26/7/2022</a:t>
             </a:fld>
             <a:endParaRPr lang="es-419"/>
           </a:p>
@@ -1849,7 +1850,7 @@
           <a:p>
             <a:fld id="{9E11D292-9858-43A2-94EF-E1E63D9E27EF}" type="datetimeFigureOut">
               <a:rPr lang="es-419" smtClean="0"/>
-              <a:t>25/7/2022</a:t>
+              <a:t>26/7/2022</a:t>
             </a:fld>
             <a:endParaRPr lang="es-419"/>
           </a:p>
@@ -1991,7 +1992,7 @@
           <a:p>
             <a:fld id="{9E11D292-9858-43A2-94EF-E1E63D9E27EF}" type="datetimeFigureOut">
               <a:rPr lang="es-419" smtClean="0"/>
-              <a:t>25/7/2022</a:t>
+              <a:t>26/7/2022</a:t>
             </a:fld>
             <a:endParaRPr lang="es-419"/>
           </a:p>
@@ -2104,7 +2105,7 @@
           <a:p>
             <a:fld id="{9E11D292-9858-43A2-94EF-E1E63D9E27EF}" type="datetimeFigureOut">
               <a:rPr lang="es-419" smtClean="0"/>
-              <a:t>25/7/2022</a:t>
+              <a:t>26/7/2022</a:t>
             </a:fld>
             <a:endParaRPr lang="es-419"/>
           </a:p>
@@ -2417,7 +2418,7 @@
           <a:p>
             <a:fld id="{9E11D292-9858-43A2-94EF-E1E63D9E27EF}" type="datetimeFigureOut">
               <a:rPr lang="es-419" smtClean="0"/>
-              <a:t>25/7/2022</a:t>
+              <a:t>26/7/2022</a:t>
             </a:fld>
             <a:endParaRPr lang="es-419"/>
           </a:p>
@@ -2706,7 +2707,7 @@
           <a:p>
             <a:fld id="{9E11D292-9858-43A2-94EF-E1E63D9E27EF}" type="datetimeFigureOut">
               <a:rPr lang="es-419" smtClean="0"/>
-              <a:t>25/7/2022</a:t>
+              <a:t>26/7/2022</a:t>
             </a:fld>
             <a:endParaRPr lang="es-419"/>
           </a:p>
@@ -2949,7 +2950,7 @@
           <a:p>
             <a:fld id="{9E11D292-9858-43A2-94EF-E1E63D9E27EF}" type="datetimeFigureOut">
               <a:rPr lang="es-419" smtClean="0"/>
-              <a:t>25/7/2022</a:t>
+              <a:t>26/7/2022</a:t>
             </a:fld>
             <a:endParaRPr lang="es-419"/>
           </a:p>
@@ -3441,10 +3442,10 @@
       </p:grpSpPr>
       <p:pic>
         <p:nvPicPr>
-          <p:cNvPr id="9" name="Imagen 8" descr="Icono&#10;&#10;Descripción generada automáticamente">
-            <a:extLst>
-              <a:ext uri="{FF2B5EF4-FFF2-40B4-BE49-F238E27FC236}">
-                <a16:creationId xmlns:a16="http://schemas.microsoft.com/office/drawing/2014/main" id="{F70D137B-FFF2-4DB8-8C02-6850D3B184A8}"/>
+          <p:cNvPr id="3" name="Imagen 2" descr="Logotipo, nombre de la empresa&#10;&#10;Descripción generada automáticamente">
+            <a:extLst>
+              <a:ext uri="{FF2B5EF4-FFF2-40B4-BE49-F238E27FC236}">
+                <a16:creationId xmlns:a16="http://schemas.microsoft.com/office/drawing/2014/main" id="{E089FDE9-409C-A8AC-59E4-B3AE9D935EEC}"/>
               </a:ext>
             </a:extLst>
           </p:cNvPr>
@@ -3467,80 +3468,14 @@
         </p:blipFill>
         <p:spPr>
           <a:xfrm>
-            <a:off x="321733" y="802215"/>
-            <a:ext cx="3400481" cy="1787994"/>
+            <a:off x="643467" y="972310"/>
+            <a:ext cx="3278292" cy="1966975"/>
           </a:xfrm>
           <a:prstGeom prst="rect">
             <a:avLst/>
           </a:prstGeom>
         </p:spPr>
       </p:pic>
-      <p:sp>
-        <p:nvSpPr>
-          <p:cNvPr id="80" name="Rectangle 79">
-            <a:extLst>
-              <a:ext uri="{FF2B5EF4-FFF2-40B4-BE49-F238E27FC236}">
-                <a16:creationId xmlns:a16="http://schemas.microsoft.com/office/drawing/2014/main" id="{E3B4FF89-C45F-4E24-B963-61E855708F2A}"/>
-              </a:ext>
-              <a:ext uri="{C183D7F6-B498-43B3-948B-1728B52AA6E4}">
-                <adec:decorative xmlns:adec="http://schemas.microsoft.com/office/drawing/2017/decorative" val="1"/>
-              </a:ext>
-            </a:extLst>
-          </p:cNvPr>
-          <p:cNvSpPr>
-            <a:spLocks noGrp="1" noRot="1" noChangeAspect="1" noMove="1" noResize="1" noEditPoints="1" noAdjustHandles="1" noChangeArrowheads="1" noChangeShapeType="1" noTextEdit="1"/>
-          </p:cNvSpPr>
-          <p:nvPr>
-            <p:extLst>
-              <p:ext uri="{386F3935-93C4-4BCD-93E2-E3B085C9AB24}">
-                <p16:designElem xmlns:p16="http://schemas.microsoft.com/office/powerpoint/2015/main" val="1"/>
-              </p:ext>
-            </p:extLst>
-          </p:nvPr>
-        </p:nvSpPr>
-        <p:spPr>
-          <a:xfrm>
-            <a:off x="4023671" y="0"/>
-            <a:ext cx="73152" cy="6858000"/>
-          </a:xfrm>
-          <a:prstGeom prst="rect">
-            <a:avLst/>
-          </a:prstGeom>
-          <a:solidFill>
-            <a:schemeClr val="tx1">
-              <a:lumMod val="75000"/>
-              <a:lumOff val="25000"/>
-            </a:schemeClr>
-          </a:solidFill>
-          <a:ln>
-            <a:noFill/>
-          </a:ln>
-        </p:spPr>
-        <p:style>
-          <a:lnRef idx="2">
-            <a:schemeClr val="accent1">
-              <a:shade val="50000"/>
-            </a:schemeClr>
-          </a:lnRef>
-          <a:fillRef idx="1">
-            <a:schemeClr val="accent1"/>
-          </a:fillRef>
-          <a:effectRef idx="0">
-            <a:schemeClr val="accent1"/>
-          </a:effectRef>
-          <a:fontRef idx="minor">
-            <a:schemeClr val="lt1"/>
-          </a:fontRef>
-        </p:style>
-        <p:txBody>
-          <a:bodyPr rtlCol="0" anchor="ctr"/>
-          <a:lstStyle/>
-          <a:p>
-            <a:pPr algn="ctr"/>
-            <a:endParaRPr lang="en-US"/>
-          </a:p>
-        </p:txBody>
-      </p:sp>
       <p:pic>
         <p:nvPicPr>
           <p:cNvPr id="8" name="Imagen 7" descr="Imagen que contiene Logotipo&#10;&#10;Descripción generada automáticamente">
@@ -3569,86 +3504,20 @@
         </p:blipFill>
         <p:spPr>
           <a:xfrm>
-            <a:off x="4395216" y="845821"/>
-            <a:ext cx="3401568" cy="1700784"/>
+            <a:off x="4243493" y="1019912"/>
+            <a:ext cx="3743538" cy="1871769"/>
           </a:xfrm>
           <a:prstGeom prst="rect">
             <a:avLst/>
           </a:prstGeom>
         </p:spPr>
       </p:pic>
-      <p:sp>
-        <p:nvSpPr>
-          <p:cNvPr id="82" name="Rectangle 81">
-            <a:extLst>
-              <a:ext uri="{FF2B5EF4-FFF2-40B4-BE49-F238E27FC236}">
-                <a16:creationId xmlns:a16="http://schemas.microsoft.com/office/drawing/2014/main" id="{14F25C03-EF67-4344-8AEA-7B3FA0DED024}"/>
-              </a:ext>
-              <a:ext uri="{C183D7F6-B498-43B3-948B-1728B52AA6E4}">
-                <adec:decorative xmlns:adec="http://schemas.microsoft.com/office/drawing/2017/decorative" val="1"/>
-              </a:ext>
-            </a:extLst>
-          </p:cNvPr>
-          <p:cNvSpPr>
-            <a:spLocks noGrp="1" noRot="1" noChangeAspect="1" noMove="1" noResize="1" noEditPoints="1" noAdjustHandles="1" noChangeArrowheads="1" noChangeShapeType="1" noTextEdit="1"/>
-          </p:cNvSpPr>
-          <p:nvPr>
-            <p:extLst>
-              <p:ext uri="{386F3935-93C4-4BCD-93E2-E3B085C9AB24}">
-                <p16:designElem xmlns:p16="http://schemas.microsoft.com/office/powerpoint/2015/main" val="1"/>
-              </p:ext>
-            </p:extLst>
-          </p:nvPr>
-        </p:nvSpPr>
-        <p:spPr>
-          <a:xfrm>
-            <a:off x="8107836" y="0"/>
-            <a:ext cx="73152" cy="6858000"/>
-          </a:xfrm>
-          <a:prstGeom prst="rect">
-            <a:avLst/>
-          </a:prstGeom>
-          <a:solidFill>
-            <a:schemeClr val="tx1">
-              <a:lumMod val="75000"/>
-              <a:lumOff val="25000"/>
-            </a:schemeClr>
-          </a:solidFill>
-          <a:ln>
-            <a:noFill/>
-          </a:ln>
-        </p:spPr>
-        <p:style>
-          <a:lnRef idx="2">
-            <a:schemeClr val="accent1">
-              <a:shade val="50000"/>
-            </a:schemeClr>
-          </a:lnRef>
-          <a:fillRef idx="1">
-            <a:schemeClr val="accent1"/>
-          </a:fillRef>
-          <a:effectRef idx="0">
-            <a:schemeClr val="accent1"/>
-          </a:effectRef>
-          <a:fontRef idx="minor">
-            <a:schemeClr val="lt1"/>
-          </a:fontRef>
-        </p:style>
-        <p:txBody>
-          <a:bodyPr rtlCol="0" anchor="ctr"/>
-          <a:lstStyle/>
-          <a:p>
-            <a:pPr algn="ctr"/>
-            <a:endParaRPr lang="en-US"/>
-          </a:p>
-        </p:txBody>
-      </p:sp>
       <p:pic>
         <p:nvPicPr>
-          <p:cNvPr id="5" name="Imagen 4" descr="Icono&#10;&#10;Descripción generada automáticamente">
-            <a:extLst>
-              <a:ext uri="{FF2B5EF4-FFF2-40B4-BE49-F238E27FC236}">
-                <a16:creationId xmlns:a16="http://schemas.microsoft.com/office/drawing/2014/main" id="{C07CE5F1-60EB-559A-6171-58E8DAEBC0DC}"/>
+          <p:cNvPr id="4" name="Imagen 3" descr="Icono&#10;&#10;Descripción generada automáticamente">
+            <a:extLst>
+              <a:ext uri="{FF2B5EF4-FFF2-40B4-BE49-F238E27FC236}">
+                <a16:creationId xmlns:a16="http://schemas.microsoft.com/office/drawing/2014/main" id="{359A7BC8-67BF-68CF-0840-629D9E2281C2}"/>
               </a:ext>
             </a:extLst>
           </p:cNvPr>
@@ -3671,86 +3540,20 @@
         </p:blipFill>
         <p:spPr>
           <a:xfrm>
-            <a:off x="8920399" y="321733"/>
-            <a:ext cx="2544850" cy="2752344"/>
+            <a:off x="8616317" y="643466"/>
+            <a:ext cx="2624662" cy="2624662"/>
           </a:xfrm>
           <a:prstGeom prst="rect">
             <a:avLst/>
           </a:prstGeom>
         </p:spPr>
       </p:pic>
-      <p:sp>
-        <p:nvSpPr>
-          <p:cNvPr id="84" name="Rectangle 83">
-            <a:extLst>
-              <a:ext uri="{FF2B5EF4-FFF2-40B4-BE49-F238E27FC236}">
-                <a16:creationId xmlns:a16="http://schemas.microsoft.com/office/drawing/2014/main" id="{F74793DE-3651-410B-B243-8F0B1468E6A4}"/>
-              </a:ext>
-              <a:ext uri="{C183D7F6-B498-43B3-948B-1728B52AA6E4}">
-                <adec:decorative xmlns:adec="http://schemas.microsoft.com/office/drawing/2017/decorative" val="1"/>
-              </a:ext>
-            </a:extLst>
-          </p:cNvPr>
-          <p:cNvSpPr>
-            <a:spLocks noGrp="1" noRot="1" noChangeAspect="1" noMove="1" noResize="1" noEditPoints="1" noAdjustHandles="1" noChangeArrowheads="1" noChangeShapeType="1" noTextEdit="1"/>
-          </p:cNvSpPr>
-          <p:nvPr>
-            <p:extLst>
-              <p:ext uri="{386F3935-93C4-4BCD-93E2-E3B085C9AB24}">
-                <p16:designElem xmlns:p16="http://schemas.microsoft.com/office/powerpoint/2015/main" val="1"/>
-              </p:ext>
-            </p:extLst>
-          </p:nvPr>
-        </p:nvSpPr>
-        <p:spPr>
-          <a:xfrm rot="5400000">
-            <a:off x="6059424" y="-2665476"/>
-            <a:ext cx="73152" cy="12188952"/>
-          </a:xfrm>
-          <a:prstGeom prst="rect">
-            <a:avLst/>
-          </a:prstGeom>
-          <a:solidFill>
-            <a:schemeClr val="tx1">
-              <a:lumMod val="75000"/>
-              <a:lumOff val="25000"/>
-            </a:schemeClr>
-          </a:solidFill>
-          <a:ln>
-            <a:noFill/>
-          </a:ln>
-        </p:spPr>
-        <p:style>
-          <a:lnRef idx="2">
-            <a:schemeClr val="accent1">
-              <a:shade val="50000"/>
-            </a:schemeClr>
-          </a:lnRef>
-          <a:fillRef idx="1">
-            <a:schemeClr val="accent1"/>
-          </a:fillRef>
-          <a:effectRef idx="0">
-            <a:schemeClr val="accent1"/>
-          </a:effectRef>
-          <a:fontRef idx="minor">
-            <a:schemeClr val="lt1"/>
-          </a:fontRef>
-        </p:style>
-        <p:txBody>
-          <a:bodyPr rtlCol="0" anchor="ctr"/>
-          <a:lstStyle/>
-          <a:p>
-            <a:pPr algn="ctr"/>
-            <a:endParaRPr lang="en-US"/>
-          </a:p>
-        </p:txBody>
-      </p:sp>
       <p:pic>
         <p:nvPicPr>
-          <p:cNvPr id="4" name="Imagen 3" descr="Icono&#10;&#10;Descripción generada automáticamente">
-            <a:extLst>
-              <a:ext uri="{FF2B5EF4-FFF2-40B4-BE49-F238E27FC236}">
-                <a16:creationId xmlns:a16="http://schemas.microsoft.com/office/drawing/2014/main" id="{359A7BC8-67BF-68CF-0840-629D9E2281C2}"/>
+          <p:cNvPr id="11" name="Imagen 10" descr="Icono&#10;&#10;Descripción generada automáticamente">
+            <a:extLst>
+              <a:ext uri="{FF2B5EF4-FFF2-40B4-BE49-F238E27FC236}">
+                <a16:creationId xmlns:a16="http://schemas.microsoft.com/office/drawing/2014/main" id="{E0AAAB78-8E15-4404-B6F6-6496C2E185AD}"/>
               </a:ext>
             </a:extLst>
           </p:cNvPr>
@@ -3773,8 +3576,8 @@
         </p:blipFill>
         <p:spPr>
           <a:xfrm>
-            <a:off x="688678" y="3783923"/>
-            <a:ext cx="2752344" cy="2752344"/>
+            <a:off x="643467" y="3980176"/>
+            <a:ext cx="3278292" cy="1844039"/>
           </a:xfrm>
           <a:prstGeom prst="rect">
             <a:avLst/>
@@ -3783,10 +3586,10 @@
       </p:pic>
       <p:pic>
         <p:nvPicPr>
-          <p:cNvPr id="3" name="Imagen 2" descr="Logotipo, nombre de la empresa&#10;&#10;Descripción generada automáticamente">
-            <a:extLst>
-              <a:ext uri="{FF2B5EF4-FFF2-40B4-BE49-F238E27FC236}">
-                <a16:creationId xmlns:a16="http://schemas.microsoft.com/office/drawing/2014/main" id="{E089FDE9-409C-A8AC-59E4-B3AE9D935EEC}"/>
+          <p:cNvPr id="9" name="Imagen 8" descr="Icono&#10;&#10;Descripción generada automáticamente">
+            <a:extLst>
+              <a:ext uri="{FF2B5EF4-FFF2-40B4-BE49-F238E27FC236}">
+                <a16:creationId xmlns:a16="http://schemas.microsoft.com/office/drawing/2014/main" id="{F70D137B-FFF2-4DB8-8C02-6850D3B184A8}"/>
               </a:ext>
             </a:extLst>
           </p:cNvPr>
@@ -3809,8 +3612,8 @@
         </p:blipFill>
         <p:spPr>
           <a:xfrm>
-            <a:off x="4428095" y="4139625"/>
-            <a:ext cx="3401568" cy="2040940"/>
+            <a:off x="4243494" y="3927671"/>
+            <a:ext cx="3743538" cy="1968376"/>
           </a:xfrm>
           <a:prstGeom prst="rect">
             <a:avLst/>
@@ -3819,10 +3622,10 @@
       </p:pic>
       <p:pic>
         <p:nvPicPr>
-          <p:cNvPr id="11" name="Imagen 10" descr="Icono&#10;&#10;Descripción generada automáticamente">
-            <a:extLst>
-              <a:ext uri="{FF2B5EF4-FFF2-40B4-BE49-F238E27FC236}">
-                <a16:creationId xmlns:a16="http://schemas.microsoft.com/office/drawing/2014/main" id="{E0AAAB78-8E15-4404-B6F6-6496C2E185AD}"/>
+          <p:cNvPr id="5" name="Imagen 4" descr="Icono&#10;&#10;Descripción generada automáticamente">
+            <a:extLst>
+              <a:ext uri="{FF2B5EF4-FFF2-40B4-BE49-F238E27FC236}">
+                <a16:creationId xmlns:a16="http://schemas.microsoft.com/office/drawing/2014/main" id="{C07CE5F1-60EB-559A-6171-58E8DAEBC0DC}"/>
               </a:ext>
             </a:extLst>
           </p:cNvPr>
@@ -3845,8 +3648,8 @@
         </p:blipFill>
         <p:spPr>
           <a:xfrm>
-            <a:off x="8492124" y="4203404"/>
-            <a:ext cx="3401568" cy="1913382"/>
+            <a:off x="8706314" y="3589863"/>
+            <a:ext cx="2444666" cy="2643992"/>
           </a:xfrm>
           <a:prstGeom prst="rect">
             <a:avLst/>
@@ -4043,6 +3846,220 @@
 <file path=ppt/slides/slide12.xml><?xml version="1.0" encoding="utf-8"?>
 <p:sld xmlns:a="http://schemas.openxmlformats.org/drawingml/2006/main" xmlns:r="http://schemas.openxmlformats.org/officeDocument/2006/relationships" xmlns:p="http://schemas.openxmlformats.org/presentationml/2006/main">
   <p:cSld>
+    <p:spTree>
+      <p:nvGrpSpPr>
+        <p:cNvPr id="1" name=""/>
+        <p:cNvGrpSpPr/>
+        <p:nvPr/>
+      </p:nvGrpSpPr>
+      <p:grpSpPr>
+        <a:xfrm>
+          <a:off x="0" y="0"/>
+          <a:ext cx="0" cy="0"/>
+          <a:chOff x="0" y="0"/>
+          <a:chExt cx="0" cy="0"/>
+        </a:xfrm>
+      </p:grpSpPr>
+      <p:pic>
+        <p:nvPicPr>
+          <p:cNvPr id="3" name="Picture 8" descr="Dibujo en blanco y negro&#10;&#10;Descripción generada automáticamente con confianza media">
+            <a:extLst>
+              <a:ext uri="{FF2B5EF4-FFF2-40B4-BE49-F238E27FC236}">
+                <a16:creationId xmlns:a16="http://schemas.microsoft.com/office/drawing/2014/main" id="{9A528539-8356-720D-514C-8991306D5972}"/>
+              </a:ext>
+            </a:extLst>
+          </p:cNvPr>
+          <p:cNvPicPr>
+            <a:picLocks noChangeAspect="1" noChangeArrowheads="1"/>
+          </p:cNvPicPr>
+          <p:nvPr/>
+        </p:nvPicPr>
+        <p:blipFill>
+          <a:blip r:embed="rId2">
+            <a:extLst>
+              <a:ext uri="{28A0092B-C50C-407E-A947-70E740481C1C}">
+                <a14:useLocalDpi xmlns:a14="http://schemas.microsoft.com/office/drawing/2010/main" val="0"/>
+              </a:ext>
+            </a:extLst>
+          </a:blip>
+          <a:stretch>
+            <a:fillRect/>
+          </a:stretch>
+        </p:blipFill>
+        <p:spPr bwMode="auto">
+          <a:xfrm>
+            <a:off x="1595577" y="1368702"/>
+            <a:ext cx="3662752" cy="2060298"/>
+          </a:xfrm>
+          <a:prstGeom prst="rect">
+            <a:avLst/>
+          </a:prstGeom>
+          <a:noFill/>
+          <a:extLst>
+            <a:ext uri="{909E8E84-426E-40DD-AFC4-6F175D3DCCD1}">
+              <a14:hiddenFill xmlns:a14="http://schemas.microsoft.com/office/drawing/2010/main">
+                <a:solidFill>
+                  <a:srgbClr val="FFFFFF"/>
+                </a:solidFill>
+              </a14:hiddenFill>
+            </a:ext>
+          </a:extLst>
+        </p:spPr>
+      </p:pic>
+      <p:pic>
+        <p:nvPicPr>
+          <p:cNvPr id="5" name="Picture 6" descr="Icono&#10;&#10;Descripción generada automáticamente">
+            <a:extLst>
+              <a:ext uri="{FF2B5EF4-FFF2-40B4-BE49-F238E27FC236}">
+                <a16:creationId xmlns:a16="http://schemas.microsoft.com/office/drawing/2014/main" id="{4FF9CC7B-19DF-2932-A721-DEB59C84CC91}"/>
+              </a:ext>
+            </a:extLst>
+          </p:cNvPr>
+          <p:cNvPicPr>
+            <a:picLocks noChangeAspect="1" noChangeArrowheads="1"/>
+          </p:cNvPicPr>
+          <p:nvPr/>
+        </p:nvPicPr>
+        <p:blipFill>
+          <a:blip r:embed="rId3">
+            <a:extLst>
+              <a:ext uri="{28A0092B-C50C-407E-A947-70E740481C1C}">
+                <a14:useLocalDpi xmlns:a14="http://schemas.microsoft.com/office/drawing/2010/main" val="0"/>
+              </a:ext>
+            </a:extLst>
+          </a:blip>
+          <a:stretch>
+            <a:fillRect/>
+          </a:stretch>
+        </p:blipFill>
+        <p:spPr bwMode="auto">
+          <a:xfrm>
+            <a:off x="1493900" y="3900352"/>
+            <a:ext cx="3866106" cy="1179163"/>
+          </a:xfrm>
+          <a:prstGeom prst="rect">
+            <a:avLst/>
+          </a:prstGeom>
+          <a:noFill/>
+          <a:extLst>
+            <a:ext uri="{909E8E84-426E-40DD-AFC4-6F175D3DCCD1}">
+              <a14:hiddenFill xmlns:a14="http://schemas.microsoft.com/office/drawing/2010/main">
+                <a:solidFill>
+                  <a:srgbClr val="FFFFFF"/>
+                </a:solidFill>
+              </a14:hiddenFill>
+            </a:ext>
+          </a:extLst>
+        </p:spPr>
+      </p:pic>
+      <p:pic>
+        <p:nvPicPr>
+          <p:cNvPr id="6" name="Picture 2" descr="Qué es SonarQube? – Blog QuantiKa14">
+            <a:extLst>
+              <a:ext uri="{FF2B5EF4-FFF2-40B4-BE49-F238E27FC236}">
+                <a16:creationId xmlns:a16="http://schemas.microsoft.com/office/drawing/2014/main" id="{384D8462-E99D-D143-6BC8-F82B1330EE02}"/>
+              </a:ext>
+            </a:extLst>
+          </p:cNvPr>
+          <p:cNvPicPr>
+            <a:picLocks noChangeAspect="1" noChangeArrowheads="1"/>
+          </p:cNvPicPr>
+          <p:nvPr/>
+        </p:nvPicPr>
+        <p:blipFill>
+          <a:blip r:embed="rId4">
+            <a:extLst>
+              <a:ext uri="{28A0092B-C50C-407E-A947-70E740481C1C}">
+                <a14:useLocalDpi xmlns:a14="http://schemas.microsoft.com/office/drawing/2010/main" val="0"/>
+              </a:ext>
+            </a:extLst>
+          </a:blip>
+          <a:stretch>
+            <a:fillRect/>
+          </a:stretch>
+        </p:blipFill>
+        <p:spPr bwMode="auto">
+          <a:xfrm>
+            <a:off x="6250530" y="1741353"/>
+            <a:ext cx="4733982" cy="1314995"/>
+          </a:xfrm>
+          <a:prstGeom prst="rect">
+            <a:avLst/>
+          </a:prstGeom>
+          <a:noFill/>
+          <a:extLst>
+            <a:ext uri="{909E8E84-426E-40DD-AFC4-6F175D3DCCD1}">
+              <a14:hiddenFill xmlns:a14="http://schemas.microsoft.com/office/drawing/2010/main">
+                <a:solidFill>
+                  <a:srgbClr val="FFFFFF"/>
+                </a:solidFill>
+              </a14:hiddenFill>
+            </a:ext>
+          </a:extLst>
+        </p:spPr>
+      </p:pic>
+      <p:pic>
+        <p:nvPicPr>
+          <p:cNvPr id="7" name="Picture 4" descr="Forma&#10;&#10;Descripción generada automáticamente con confianza media">
+            <a:extLst>
+              <a:ext uri="{FF2B5EF4-FFF2-40B4-BE49-F238E27FC236}">
+                <a16:creationId xmlns:a16="http://schemas.microsoft.com/office/drawing/2014/main" id="{583EB435-F8A4-DCCF-A224-D27876BF44FB}"/>
+              </a:ext>
+            </a:extLst>
+          </p:cNvPr>
+          <p:cNvPicPr>
+            <a:picLocks noChangeAspect="1" noChangeArrowheads="1"/>
+          </p:cNvPicPr>
+          <p:nvPr/>
+        </p:nvPicPr>
+        <p:blipFill>
+          <a:blip r:embed="rId5">
+            <a:extLst>
+              <a:ext uri="{28A0092B-C50C-407E-A947-70E740481C1C}">
+                <a14:useLocalDpi xmlns:a14="http://schemas.microsoft.com/office/drawing/2010/main" val="0"/>
+              </a:ext>
+            </a:extLst>
+          </a:blip>
+          <a:stretch>
+            <a:fillRect/>
+          </a:stretch>
+        </p:blipFill>
+        <p:spPr bwMode="auto">
+          <a:xfrm>
+            <a:off x="6250530" y="3726579"/>
+            <a:ext cx="4733982" cy="1526708"/>
+          </a:xfrm>
+          <a:prstGeom prst="rect">
+            <a:avLst/>
+          </a:prstGeom>
+          <a:noFill/>
+          <a:extLst>
+            <a:ext uri="{909E8E84-426E-40DD-AFC4-6F175D3DCCD1}">
+              <a14:hiddenFill xmlns:a14="http://schemas.microsoft.com/office/drawing/2010/main">
+                <a:solidFill>
+                  <a:srgbClr val="FFFFFF"/>
+                </a:solidFill>
+              </a14:hiddenFill>
+            </a:ext>
+          </a:extLst>
+        </p:spPr>
+      </p:pic>
+    </p:spTree>
+    <p:extLst>
+      <p:ext uri="{BB962C8B-B14F-4D97-AF65-F5344CB8AC3E}">
+        <p14:creationId xmlns:p14="http://schemas.microsoft.com/office/powerpoint/2010/main" val="2131387998"/>
+      </p:ext>
+    </p:extLst>
+  </p:cSld>
+  <p:clrMapOvr>
+    <a:masterClrMapping/>
+  </p:clrMapOvr>
+</p:sld>
+</file>
+
+<file path=ppt/slides/slide13.xml><?xml version="1.0" encoding="utf-8"?>
+<p:sld xmlns:a="http://schemas.openxmlformats.org/drawingml/2006/main" xmlns:r="http://schemas.openxmlformats.org/officeDocument/2006/relationships" xmlns:p="http://schemas.openxmlformats.org/presentationml/2006/main">
+  <p:cSld>
     <p:bg>
       <p:bgPr>
         <a:solidFill>
@@ -4065,12 +4082,12 @@
           <a:chExt cx="0" cy="0"/>
         </a:xfrm>
       </p:grpSpPr>
-      <p:sp>
+      <p:sp useBgFill="1">
         <p:nvSpPr>
-          <p:cNvPr id="1060" name="Rectangle 1041">
-            <a:extLst>
-              <a:ext uri="{FF2B5EF4-FFF2-40B4-BE49-F238E27FC236}">
-                <a16:creationId xmlns:a16="http://schemas.microsoft.com/office/drawing/2014/main" id="{6F79B0DD-2C63-4EE5-804F-B8E391FC1E45}"/>
+          <p:cNvPr id="9" name="Rectangle 8">
+            <a:extLst>
+              <a:ext uri="{FF2B5EF4-FFF2-40B4-BE49-F238E27FC236}">
+                <a16:creationId xmlns:a16="http://schemas.microsoft.com/office/drawing/2014/main" id="{5E6B3632-31A7-4B9A-9B3B-DAADD1D372BA}"/>
               </a:ext>
               <a:ext uri="{C183D7F6-B498-43B3-948B-1728B52AA6E4}">
                 <adec:decorative xmlns:adec="http://schemas.microsoft.com/office/drawing/2017/decorative" val="1"/>
@@ -4090,18 +4107,12 @@
         </p:nvSpPr>
         <p:spPr>
           <a:xfrm>
-            <a:off x="3137" y="0"/>
-            <a:ext cx="12192000" cy="6858000"/>
-          </a:xfrm>
-          <a:prstGeom prst="rect">
-            <a:avLst/>
-          </a:prstGeom>
-          <a:solidFill>
-            <a:schemeClr val="bg1">
-              <a:lumMod val="75000"/>
-              <a:alpha val="80000"/>
-            </a:schemeClr>
-          </a:solidFill>
+            <a:off x="-1" y="0"/>
+            <a:ext cx="12188952" cy="6858000"/>
+          </a:xfrm>
+          <a:prstGeom prst="rect">
+            <a:avLst/>
+          </a:prstGeom>
           <a:ln>
             <a:noFill/>
           </a:ln>
@@ -4127,91 +4138,73 @@
           <a:lstStyle/>
           <a:p>
             <a:pPr algn="ctr"/>
-            <a:endParaRPr lang="en-US"/>
+            <a:endParaRPr lang="en-US" dirty="0"/>
           </a:p>
         </p:txBody>
       </p:sp>
       <p:sp>
         <p:nvSpPr>
-          <p:cNvPr id="1061" name="Rectangle 1043">
-            <a:extLst>
-              <a:ext uri="{FF2B5EF4-FFF2-40B4-BE49-F238E27FC236}">
-                <a16:creationId xmlns:a16="http://schemas.microsoft.com/office/drawing/2014/main" id="{627DB8AB-CD55-4C8F-9043-52652B89231A}"/>
-              </a:ext>
-              <a:ext uri="{C183D7F6-B498-43B3-948B-1728B52AA6E4}">
-                <adec:decorative xmlns:adec="http://schemas.microsoft.com/office/drawing/2017/decorative" val="1"/>
-              </a:ext>
-            </a:extLst>
-          </p:cNvPr>
-          <p:cNvSpPr>
-            <a:spLocks noGrp="1" noRot="1" noChangeAspect="1" noMove="1" noResize="1" noEditPoints="1" noAdjustHandles="1" noChangeArrowheads="1" noChangeShapeType="1" noTextEdit="1"/>
-          </p:cNvSpPr>
-          <p:nvPr>
-            <p:extLst>
-              <p:ext uri="{386F3935-93C4-4BCD-93E2-E3B085C9AB24}">
-                <p16:designElem xmlns:p16="http://schemas.microsoft.com/office/powerpoint/2015/main" val="1"/>
-              </p:ext>
-            </p:extLst>
-          </p:nvPr>
+          <p:cNvPr id="4" name="CuadroTexto 3">
+            <a:extLst>
+              <a:ext uri="{FF2B5EF4-FFF2-40B4-BE49-F238E27FC236}">
+                <a16:creationId xmlns:a16="http://schemas.microsoft.com/office/drawing/2014/main" id="{1D9B30BC-A145-CC0C-9BE2-35B4592B2C2B}"/>
+              </a:ext>
+            </a:extLst>
+          </p:cNvPr>
+          <p:cNvSpPr txBox="1"/>
+          <p:nvPr/>
         </p:nvSpPr>
         <p:spPr>
           <a:xfrm>
-            <a:off x="643466" y="643466"/>
-            <a:ext cx="5364255" cy="2706794"/>
-          </a:xfrm>
-          <a:prstGeom prst="rect">
-            <a:avLst/>
-          </a:prstGeom>
-          <a:solidFill>
-            <a:srgbClr val="FFFFFF"/>
-          </a:solidFill>
-          <a:ln w="9525">
-            <a:noFill/>
-          </a:ln>
-          <a:effectLst>
-            <a:outerShdw blurRad="63500" dist="17780" dir="5400000" algn="t" rotWithShape="0">
-              <a:prstClr val="black">
-                <a:alpha val="43000"/>
-              </a:prstClr>
-            </a:outerShdw>
-          </a:effectLst>
-        </p:spPr>
-        <p:style>
-          <a:lnRef idx="2">
-            <a:schemeClr val="accent1">
-              <a:shade val="50000"/>
-            </a:schemeClr>
-          </a:lnRef>
-          <a:fillRef idx="1">
-            <a:schemeClr val="accent1"/>
-          </a:fillRef>
-          <a:effectRef idx="0">
-            <a:schemeClr val="accent1"/>
-          </a:effectRef>
-          <a:fontRef idx="minor">
-            <a:schemeClr val="lt1"/>
-          </a:fontRef>
-        </p:style>
+            <a:off x="8379725" y="640081"/>
+            <a:ext cx="3206143" cy="5489009"/>
+          </a:xfrm>
+          <a:prstGeom prst="rect">
+            <a:avLst/>
+          </a:prstGeom>
+        </p:spPr>
         <p:txBody>
-          <a:bodyPr rtlCol="0" anchor="ctr"/>
+          <a:bodyPr vert="horz" lIns="91440" tIns="45720" rIns="91440" bIns="45720" rtlCol="0" anchor="ctr">
+            <a:normAutofit/>
+          </a:bodyPr>
           <a:lstStyle/>
           <a:p>
-            <a:pPr algn="ctr"/>
-            <a:endParaRPr lang="en-US"/>
+            <a:pPr>
+              <a:lnSpc>
+                <a:spcPct val="90000"/>
+              </a:lnSpc>
+              <a:spcBef>
+                <a:spcPct val="0"/>
+              </a:spcBef>
+              <a:spcAft>
+                <a:spcPts val="600"/>
+              </a:spcAft>
+            </a:pPr>
+            <a:r>
+              <a:rPr lang="en-US" sz="5200" kern="1200">
+                <a:solidFill>
+                  <a:schemeClr val="tx1"/>
+                </a:solidFill>
+                <a:latin typeface="+mj-lt"/>
+                <a:ea typeface="+mj-ea"/>
+                <a:cs typeface="+mj-cs"/>
+              </a:rPr>
+              <a:t>TERCERA OPCION</a:t>
+            </a:r>
           </a:p>
         </p:txBody>
       </p:sp>
       <p:pic>
         <p:nvPicPr>
-          <p:cNvPr id="1032" name="Picture 8" descr="Dibujo en blanco y negro&#10;&#10;Descripción generada automáticamente con confianza media">
-            <a:extLst>
-              <a:ext uri="{FF2B5EF4-FFF2-40B4-BE49-F238E27FC236}">
-                <a16:creationId xmlns:a16="http://schemas.microsoft.com/office/drawing/2014/main" id="{64EB4CCA-55B1-E895-A8B9-05352930852A}"/>
+          <p:cNvPr id="6" name="Gráfico 5">
+            <a:extLst>
+              <a:ext uri="{FF2B5EF4-FFF2-40B4-BE49-F238E27FC236}">
+                <a16:creationId xmlns:a16="http://schemas.microsoft.com/office/drawing/2014/main" id="{4EE30CEB-7EB4-82DA-E821-AD49628F64BF}"/>
               </a:ext>
             </a:extLst>
           </p:cNvPr>
           <p:cNvPicPr>
-            <a:picLocks noChangeAspect="1" noChangeArrowheads="1"/>
+            <a:picLocks noChangeAspect="1"/>
           </p:cNvPicPr>
           <p:nvPr/>
         </p:nvPicPr>
@@ -4221,449 +4214,29 @@
               <a:ext uri="{28A0092B-C50C-407E-A947-70E740481C1C}">
                 <a14:useLocalDpi xmlns:a14="http://schemas.microsoft.com/office/drawing/2010/main" val="0"/>
               </a:ext>
+              <a:ext uri="{96DAC541-7B7A-43D3-8B79-37D633B846F1}">
+                <asvg:svgBlip xmlns:asvg="http://schemas.microsoft.com/office/drawing/2016/SVG/main" r:embed="rId3"/>
+              </a:ext>
             </a:extLst>
           </a:blip>
           <a:stretch>
             <a:fillRect/>
           </a:stretch>
         </p:blipFill>
-        <p:spPr bwMode="auto">
-          <a:xfrm>
-            <a:off x="1493900" y="965200"/>
-            <a:ext cx="3662752" cy="2060298"/>
-          </a:xfrm>
-          <a:prstGeom prst="rect">
-            <a:avLst/>
-          </a:prstGeom>
-          <a:noFill/>
-          <a:extLst>
-            <a:ext uri="{909E8E84-426E-40DD-AFC4-6F175D3DCCD1}">
-              <a14:hiddenFill xmlns:a14="http://schemas.microsoft.com/office/drawing/2010/main">
-                <a:solidFill>
-                  <a:srgbClr val="FFFFFF"/>
-                </a:solidFill>
-              </a14:hiddenFill>
-            </a:ext>
-          </a:extLst>
-        </p:spPr>
-      </p:pic>
-      <p:sp>
-        <p:nvSpPr>
-          <p:cNvPr id="1062" name="Rectangle 1045">
-            <a:extLst>
-              <a:ext uri="{FF2B5EF4-FFF2-40B4-BE49-F238E27FC236}">
-                <a16:creationId xmlns:a16="http://schemas.microsoft.com/office/drawing/2014/main" id="{53059C5A-91CB-4024-9B4E-20082E25C70B}"/>
-              </a:ext>
-              <a:ext uri="{C183D7F6-B498-43B3-948B-1728B52AA6E4}">
-                <adec:decorative xmlns:adec="http://schemas.microsoft.com/office/drawing/2017/decorative" val="1"/>
-              </a:ext>
-            </a:extLst>
-          </p:cNvPr>
-          <p:cNvSpPr>
-            <a:spLocks noGrp="1" noRot="1" noChangeAspect="1" noMove="1" noResize="1" noEditPoints="1" noAdjustHandles="1" noChangeArrowheads="1" noChangeShapeType="1" noTextEdit="1"/>
-          </p:cNvSpPr>
-          <p:nvPr>
-            <p:extLst>
-              <p:ext uri="{386F3935-93C4-4BCD-93E2-E3B085C9AB24}">
-                <p16:designElem xmlns:p16="http://schemas.microsoft.com/office/powerpoint/2015/main" val="1"/>
-              </p:ext>
-            </p:extLst>
-          </p:nvPr>
-        </p:nvSpPr>
-        <p:spPr>
-          <a:xfrm>
-            <a:off x="6168589" y="643466"/>
-            <a:ext cx="5376806" cy="2706794"/>
-          </a:xfrm>
-          <a:prstGeom prst="rect">
-            <a:avLst/>
-          </a:prstGeom>
-          <a:solidFill>
-            <a:srgbClr val="FFFFFF"/>
-          </a:solidFill>
-          <a:ln w="9525">
-            <a:noFill/>
-          </a:ln>
-          <a:effectLst>
-            <a:outerShdw blurRad="63500" dist="17780" dir="5400000" algn="t" rotWithShape="0">
-              <a:prstClr val="black">
-                <a:alpha val="43000"/>
-              </a:prstClr>
-            </a:outerShdw>
-          </a:effectLst>
-        </p:spPr>
-        <p:style>
-          <a:lnRef idx="2">
-            <a:schemeClr val="accent1">
-              <a:shade val="50000"/>
-            </a:schemeClr>
-          </a:lnRef>
-          <a:fillRef idx="1">
-            <a:schemeClr val="accent1"/>
-          </a:fillRef>
-          <a:effectRef idx="0">
-            <a:schemeClr val="accent1"/>
-          </a:effectRef>
-          <a:fontRef idx="minor">
-            <a:schemeClr val="lt1"/>
-          </a:fontRef>
-        </p:style>
-        <p:txBody>
-          <a:bodyPr rtlCol="0" anchor="ctr"/>
-          <a:lstStyle/>
-          <a:p>
-            <a:pPr algn="ctr"/>
-            <a:endParaRPr lang="en-US"/>
-          </a:p>
-        </p:txBody>
-      </p:sp>
-      <p:pic>
-        <p:nvPicPr>
-          <p:cNvPr id="1028" name="Picture 4" descr="Forma&#10;&#10;Descripción generada automáticamente con confianza media">
-            <a:extLst>
-              <a:ext uri="{FF2B5EF4-FFF2-40B4-BE49-F238E27FC236}">
-                <a16:creationId xmlns:a16="http://schemas.microsoft.com/office/drawing/2014/main" id="{C4CCB78D-B535-11D2-5C87-F648B2E76A66}"/>
-              </a:ext>
-            </a:extLst>
-          </p:cNvPr>
-          <p:cNvPicPr>
-            <a:picLocks noChangeAspect="1" noChangeArrowheads="1"/>
-          </p:cNvPicPr>
-          <p:nvPr/>
-        </p:nvPicPr>
-        <p:blipFill>
-          <a:blip r:embed="rId3">
-            <a:extLst>
-              <a:ext uri="{28A0092B-C50C-407E-A947-70E740481C1C}">
-                <a14:useLocalDpi xmlns:a14="http://schemas.microsoft.com/office/drawing/2010/main" val="0"/>
-              </a:ext>
-            </a:extLst>
-          </a:blip>
-          <a:stretch>
-            <a:fillRect/>
-          </a:stretch>
-        </p:blipFill>
-        <p:spPr bwMode="auto">
-          <a:xfrm>
-            <a:off x="6489680" y="1231995"/>
-            <a:ext cx="4733982" cy="1526708"/>
-          </a:xfrm>
-          <a:prstGeom prst="rect">
-            <a:avLst/>
-          </a:prstGeom>
-          <a:noFill/>
-          <a:extLst>
-            <a:ext uri="{909E8E84-426E-40DD-AFC4-6F175D3DCCD1}">
-              <a14:hiddenFill xmlns:a14="http://schemas.microsoft.com/office/drawing/2010/main">
-                <a:solidFill>
-                  <a:srgbClr val="FFFFFF"/>
-                </a:solidFill>
-              </a14:hiddenFill>
-            </a:ext>
-          </a:extLst>
-        </p:spPr>
-      </p:pic>
-      <p:sp>
-        <p:nvSpPr>
-          <p:cNvPr id="1063" name="Rectangle 1047">
-            <a:extLst>
-              <a:ext uri="{FF2B5EF4-FFF2-40B4-BE49-F238E27FC236}">
-                <a16:creationId xmlns:a16="http://schemas.microsoft.com/office/drawing/2014/main" id="{184884BF-A898-4EFF-9504-E13EBE3FF62E}"/>
-              </a:ext>
-              <a:ext uri="{C183D7F6-B498-43B3-948B-1728B52AA6E4}">
-                <adec:decorative xmlns:adec="http://schemas.microsoft.com/office/drawing/2017/decorative" val="1"/>
-              </a:ext>
-            </a:extLst>
-          </p:cNvPr>
-          <p:cNvSpPr>
-            <a:spLocks noGrp="1" noRot="1" noChangeAspect="1" noMove="1" noResize="1" noEditPoints="1" noAdjustHandles="1" noChangeArrowheads="1" noChangeShapeType="1" noTextEdit="1"/>
-          </p:cNvSpPr>
-          <p:nvPr>
-            <p:extLst>
-              <p:ext uri="{386F3935-93C4-4BCD-93E2-E3B085C9AB24}">
-                <p16:designElem xmlns:p16="http://schemas.microsoft.com/office/powerpoint/2015/main" val="1"/>
-              </p:ext>
-            </p:extLst>
-          </p:nvPr>
-        </p:nvSpPr>
-        <p:spPr>
-          <a:xfrm>
-            <a:off x="643466" y="3514513"/>
-            <a:ext cx="5364255" cy="2703406"/>
-          </a:xfrm>
-          <a:prstGeom prst="rect">
-            <a:avLst/>
-          </a:prstGeom>
-          <a:solidFill>
-            <a:srgbClr val="FFFFFF"/>
-          </a:solidFill>
-          <a:ln w="9525">
-            <a:noFill/>
-          </a:ln>
-          <a:effectLst>
-            <a:outerShdw blurRad="63500" dist="17780" dir="5400000" algn="t" rotWithShape="0">
-              <a:prstClr val="black">
-                <a:alpha val="43000"/>
-              </a:prstClr>
-            </a:outerShdw>
-          </a:effectLst>
-        </p:spPr>
-        <p:style>
-          <a:lnRef idx="2">
-            <a:schemeClr val="accent1">
-              <a:shade val="50000"/>
-            </a:schemeClr>
-          </a:lnRef>
-          <a:fillRef idx="1">
-            <a:schemeClr val="accent1"/>
-          </a:fillRef>
-          <a:effectRef idx="0">
-            <a:schemeClr val="accent1"/>
-          </a:effectRef>
-          <a:fontRef idx="minor">
-            <a:schemeClr val="lt1"/>
-          </a:fontRef>
-        </p:style>
-        <p:txBody>
-          <a:bodyPr rtlCol="0" anchor="ctr"/>
-          <a:lstStyle/>
-          <a:p>
-            <a:pPr algn="ctr"/>
-            <a:endParaRPr lang="en-US"/>
-          </a:p>
-        </p:txBody>
-      </p:sp>
-      <p:pic>
-        <p:nvPicPr>
-          <p:cNvPr id="1030" name="Picture 6" descr="Icono&#10;&#10;Descripción generada automáticamente">
-            <a:extLst>
-              <a:ext uri="{FF2B5EF4-FFF2-40B4-BE49-F238E27FC236}">
-                <a16:creationId xmlns:a16="http://schemas.microsoft.com/office/drawing/2014/main" id="{B58E20E4-0ACB-3C31-31B8-B8DFFCF3509D}"/>
-              </a:ext>
-            </a:extLst>
-          </p:cNvPr>
-          <p:cNvPicPr>
-            <a:picLocks noChangeAspect="1" noChangeArrowheads="1"/>
-          </p:cNvPicPr>
-          <p:nvPr/>
-        </p:nvPicPr>
-        <p:blipFill>
-          <a:blip r:embed="rId4">
-            <a:extLst>
-              <a:ext uri="{28A0092B-C50C-407E-A947-70E740481C1C}">
-                <a14:useLocalDpi xmlns:a14="http://schemas.microsoft.com/office/drawing/2010/main" val="0"/>
-              </a:ext>
-            </a:extLst>
-          </a:blip>
-          <a:stretch>
-            <a:fillRect/>
-          </a:stretch>
-        </p:blipFill>
-        <p:spPr bwMode="auto">
-          <a:xfrm>
-            <a:off x="965201" y="4144463"/>
-            <a:ext cx="4733982" cy="1443865"/>
-          </a:xfrm>
-          <a:prstGeom prst="rect">
-            <a:avLst/>
-          </a:prstGeom>
-          <a:noFill/>
-          <a:extLst>
-            <a:ext uri="{909E8E84-426E-40DD-AFC4-6F175D3DCCD1}">
-              <a14:hiddenFill xmlns:a14="http://schemas.microsoft.com/office/drawing/2010/main">
-                <a:solidFill>
-                  <a:srgbClr val="FFFFFF"/>
-                </a:solidFill>
-              </a14:hiddenFill>
-            </a:ext>
-          </a:extLst>
-        </p:spPr>
-      </p:pic>
-      <p:sp>
-        <p:nvSpPr>
-          <p:cNvPr id="1064" name="Rectangle 1049">
-            <a:extLst>
-              <a:ext uri="{FF2B5EF4-FFF2-40B4-BE49-F238E27FC236}">
-                <a16:creationId xmlns:a16="http://schemas.microsoft.com/office/drawing/2014/main" id="{7B32D337-FDA6-4468-ADB1-7038E5FC0BA9}"/>
-              </a:ext>
-              <a:ext uri="{C183D7F6-B498-43B3-948B-1728B52AA6E4}">
-                <adec:decorative xmlns:adec="http://schemas.microsoft.com/office/drawing/2017/decorative" val="1"/>
-              </a:ext>
-            </a:extLst>
-          </p:cNvPr>
-          <p:cNvSpPr>
-            <a:spLocks noGrp="1" noRot="1" noChangeAspect="1" noMove="1" noResize="1" noEditPoints="1" noAdjustHandles="1" noChangeArrowheads="1" noChangeShapeType="1" noTextEdit="1"/>
-          </p:cNvSpPr>
-          <p:nvPr>
-            <p:extLst>
-              <p:ext uri="{386F3935-93C4-4BCD-93E2-E3B085C9AB24}">
-                <p16:designElem xmlns:p16="http://schemas.microsoft.com/office/powerpoint/2015/main" val="1"/>
-              </p:ext>
-            </p:extLst>
-          </p:nvPr>
-        </p:nvSpPr>
-        <p:spPr>
-          <a:xfrm>
-            <a:off x="6168589" y="3514513"/>
-            <a:ext cx="5376806" cy="2706794"/>
-          </a:xfrm>
-          <a:prstGeom prst="rect">
-            <a:avLst/>
-          </a:prstGeom>
-          <a:solidFill>
-            <a:srgbClr val="FFFFFF"/>
-          </a:solidFill>
-          <a:ln w="9525">
-            <a:noFill/>
-          </a:ln>
-          <a:effectLst>
-            <a:outerShdw blurRad="63500" dist="17780" dir="5400000" algn="t" rotWithShape="0">
-              <a:prstClr val="black">
-                <a:alpha val="43000"/>
-              </a:prstClr>
-            </a:outerShdw>
-          </a:effectLst>
-        </p:spPr>
-        <p:style>
-          <a:lnRef idx="2">
-            <a:schemeClr val="accent1">
-              <a:shade val="50000"/>
-            </a:schemeClr>
-          </a:lnRef>
-          <a:fillRef idx="1">
-            <a:schemeClr val="accent1"/>
-          </a:fillRef>
-          <a:effectRef idx="0">
-            <a:schemeClr val="accent1"/>
-          </a:effectRef>
-          <a:fontRef idx="minor">
-            <a:schemeClr val="lt1"/>
-          </a:fontRef>
-        </p:style>
-        <p:txBody>
-          <a:bodyPr rtlCol="0" anchor="ctr"/>
-          <a:lstStyle/>
-          <a:p>
-            <a:pPr algn="ctr"/>
-            <a:endParaRPr lang="en-US"/>
-          </a:p>
-        </p:txBody>
-      </p:sp>
-      <p:pic>
-        <p:nvPicPr>
-          <p:cNvPr id="1026" name="Picture 2" descr="Qué es SonarQube? – Blog QuantiKa14">
-            <a:extLst>
-              <a:ext uri="{FF2B5EF4-FFF2-40B4-BE49-F238E27FC236}">
-                <a16:creationId xmlns:a16="http://schemas.microsoft.com/office/drawing/2014/main" id="{5FFE794D-B6DC-5EDF-08FC-86FB21D6A766}"/>
-              </a:ext>
-            </a:extLst>
-          </p:cNvPr>
-          <p:cNvPicPr>
-            <a:picLocks noChangeAspect="1" noChangeArrowheads="1"/>
-          </p:cNvPicPr>
-          <p:nvPr/>
-        </p:nvPicPr>
-        <p:blipFill>
-          <a:blip r:embed="rId5">
-            <a:extLst>
-              <a:ext uri="{28A0092B-C50C-407E-A947-70E740481C1C}">
-                <a14:useLocalDpi xmlns:a14="http://schemas.microsoft.com/office/drawing/2010/main" val="0"/>
-              </a:ext>
-            </a:extLst>
-          </a:blip>
-          <a:stretch>
-            <a:fillRect/>
-          </a:stretch>
-        </p:blipFill>
-        <p:spPr bwMode="auto">
-          <a:xfrm>
-            <a:off x="6489680" y="4208898"/>
-            <a:ext cx="4733982" cy="1314995"/>
-          </a:xfrm>
-          <a:prstGeom prst="rect">
-            <a:avLst/>
-          </a:prstGeom>
-          <a:noFill/>
-          <a:extLst>
-            <a:ext uri="{909E8E84-426E-40DD-AFC4-6F175D3DCCD1}">
-              <a14:hiddenFill xmlns:a14="http://schemas.microsoft.com/office/drawing/2010/main">
-                <a:solidFill>
-                  <a:srgbClr val="FFFFFF"/>
-                </a:solidFill>
-              </a14:hiddenFill>
-            </a:ext>
-          </a:extLst>
+        <p:spPr>
+          <a:xfrm>
+            <a:off x="4013636" y="1052865"/>
+            <a:ext cx="3763006" cy="4663440"/>
+          </a:xfrm>
+          <a:prstGeom prst="rect">
+            <a:avLst/>
+          </a:prstGeom>
         </p:spPr>
       </p:pic>
     </p:spTree>
     <p:extLst>
       <p:ext uri="{BB962C8B-B14F-4D97-AF65-F5344CB8AC3E}">
-        <p14:creationId xmlns:p14="http://schemas.microsoft.com/office/powerpoint/2010/main" val="1096323304"/>
-      </p:ext>
-    </p:extLst>
-  </p:cSld>
-  <p:clrMapOvr>
-    <a:masterClrMapping/>
-  </p:clrMapOvr>
-</p:sld>
-</file>
-
-<file path=ppt/slides/slide13.xml><?xml version="1.0" encoding="utf-8"?>
-<p:sld xmlns:a="http://schemas.openxmlformats.org/drawingml/2006/main" xmlns:r="http://schemas.openxmlformats.org/officeDocument/2006/relationships" xmlns:p="http://schemas.openxmlformats.org/presentationml/2006/main">
-  <p:cSld>
-    <p:spTree>
-      <p:nvGrpSpPr>
-        <p:cNvPr id="1" name=""/>
-        <p:cNvGrpSpPr/>
-        <p:nvPr/>
-      </p:nvGrpSpPr>
-      <p:grpSpPr>
-        <a:xfrm>
-          <a:off x="0" y="0"/>
-          <a:ext cx="0" cy="0"/>
-          <a:chOff x="0" y="0"/>
-          <a:chExt cx="0" cy="0"/>
-        </a:xfrm>
-      </p:grpSpPr>
-      <p:sp>
-        <p:nvSpPr>
-          <p:cNvPr id="4" name="CuadroTexto 3">
-            <a:extLst>
-              <a:ext uri="{FF2B5EF4-FFF2-40B4-BE49-F238E27FC236}">
-                <a16:creationId xmlns:a16="http://schemas.microsoft.com/office/drawing/2014/main" id="{1D9B30BC-A145-CC0C-9BE2-35B4592B2C2B}"/>
-              </a:ext>
-            </a:extLst>
-          </p:cNvPr>
-          <p:cNvSpPr txBox="1"/>
-          <p:nvPr/>
-        </p:nvSpPr>
-        <p:spPr>
-          <a:xfrm>
-            <a:off x="1473958" y="764275"/>
-            <a:ext cx="9676263" cy="923330"/>
-          </a:xfrm>
-          <a:prstGeom prst="rect">
-            <a:avLst/>
-          </a:prstGeom>
-          <a:noFill/>
-        </p:spPr>
-        <p:txBody>
-          <a:bodyPr wrap="square" rtlCol="0">
-            <a:spAutoFit/>
-          </a:bodyPr>
-          <a:lstStyle/>
-          <a:p>
-            <a:r>
-              <a:rPr lang="es-419" sz="5400" dirty="0"/>
-              <a:t>TERCERA OPCION</a:t>
-            </a:r>
-          </a:p>
-        </p:txBody>
-      </p:sp>
-    </p:spTree>
-    <p:extLst>
-      <p:ext uri="{BB962C8B-B14F-4D97-AF65-F5344CB8AC3E}">
-        <p14:creationId xmlns:p14="http://schemas.microsoft.com/office/powerpoint/2010/main" val="2131387998"/>
+        <p14:creationId xmlns:p14="http://schemas.microsoft.com/office/powerpoint/2010/main" val="891167555"/>
       </p:ext>
     </p:extLst>
   </p:cSld>
@@ -4698,21 +4271,21 @@
           <a:chExt cx="0" cy="0"/>
         </a:xfrm>
       </p:grpSpPr>
-      <p:cxnSp>
-        <p:nvCxnSpPr>
-          <p:cNvPr id="42" name="Straight Connector 41">
-            <a:extLst>
-              <a:ext uri="{FF2B5EF4-FFF2-40B4-BE49-F238E27FC236}">
-                <a16:creationId xmlns:a16="http://schemas.microsoft.com/office/drawing/2014/main" id="{22F6364A-B358-4BEE-B158-0734D2C938D4}"/>
+      <p:sp>
+        <p:nvSpPr>
+          <p:cNvPr id="1060" name="Rectangle 1041">
+            <a:extLst>
+              <a:ext uri="{FF2B5EF4-FFF2-40B4-BE49-F238E27FC236}">
+                <a16:creationId xmlns:a16="http://schemas.microsoft.com/office/drawing/2014/main" id="{6F79B0DD-2C63-4EE5-804F-B8E391FC1E45}"/>
               </a:ext>
               <a:ext uri="{C183D7F6-B498-43B3-948B-1728B52AA6E4}">
                 <adec:decorative xmlns:adec="http://schemas.microsoft.com/office/drawing/2017/decorative" val="1"/>
               </a:ext>
             </a:extLst>
           </p:cNvPr>
-          <p:cNvCxnSpPr>
-            <a:cxnSpLocks noGrp="1" noRot="1" noChangeAspect="1" noMove="1" noResize="1" noEditPoints="1" noAdjustHandles="1" noChangeArrowheads="1" noChangeShapeType="1"/>
-          </p:cNvCxnSpPr>
+          <p:cNvSpPr>
+            <a:spLocks noGrp="1" noRot="1" noChangeAspect="1" noMove="1" noResize="1" noEditPoints="1" noAdjustHandles="1" noChangeArrowheads="1" noChangeShapeType="1" noTextEdit="1"/>
+          </p:cNvSpPr>
           <p:nvPr>
             <p:extLst>
               <p:ext uri="{386F3935-93C4-4BCD-93E2-E3B085C9AB24}">
@@ -4720,47 +4293,131 @@
               </p:ext>
             </p:extLst>
           </p:nvPr>
-        </p:nvCxnSpPr>
-        <p:spPr>
-          <a:xfrm>
-            <a:off x="3738202" y="1570814"/>
-            <a:ext cx="0" cy="3710227"/>
-          </a:xfrm>
-          <a:prstGeom prst="line">
-            <a:avLst/>
-          </a:prstGeom>
-          <a:ln w="19050">
-            <a:solidFill>
-              <a:srgbClr val="08B6DF"/>
-            </a:solidFill>
+        </p:nvSpPr>
+        <p:spPr>
+          <a:xfrm>
+            <a:off x="3137" y="0"/>
+            <a:ext cx="12192000" cy="6858000"/>
+          </a:xfrm>
+          <a:prstGeom prst="rect">
+            <a:avLst/>
+          </a:prstGeom>
+          <a:solidFill>
+            <a:schemeClr val="bg1">
+              <a:lumMod val="75000"/>
+              <a:alpha val="80000"/>
+            </a:schemeClr>
+          </a:solidFill>
+          <a:ln>
+            <a:noFill/>
           </a:ln>
         </p:spPr>
         <p:style>
-          <a:lnRef idx="1">
-            <a:schemeClr val="accent1"/>
+          <a:lnRef idx="2">
+            <a:schemeClr val="accent1">
+              <a:shade val="50000"/>
+            </a:schemeClr>
           </a:lnRef>
-          <a:fillRef idx="0">
+          <a:fillRef idx="1">
             <a:schemeClr val="accent1"/>
           </a:fillRef>
           <a:effectRef idx="0">
             <a:schemeClr val="accent1"/>
           </a:effectRef>
           <a:fontRef idx="minor">
-            <a:schemeClr val="tx1"/>
+            <a:schemeClr val="lt1"/>
           </a:fontRef>
         </p:style>
-      </p:cxnSp>
+        <p:txBody>
+          <a:bodyPr rtlCol="0" anchor="ctr"/>
+          <a:lstStyle/>
+          <a:p>
+            <a:pPr algn="ctr"/>
+            <a:endParaRPr lang="en-US"/>
+          </a:p>
+        </p:txBody>
+      </p:sp>
+      <p:sp>
+        <p:nvSpPr>
+          <p:cNvPr id="1061" name="Rectangle 1043">
+            <a:extLst>
+              <a:ext uri="{FF2B5EF4-FFF2-40B4-BE49-F238E27FC236}">
+                <a16:creationId xmlns:a16="http://schemas.microsoft.com/office/drawing/2014/main" id="{627DB8AB-CD55-4C8F-9043-52652B89231A}"/>
+              </a:ext>
+              <a:ext uri="{C183D7F6-B498-43B3-948B-1728B52AA6E4}">
+                <adec:decorative xmlns:adec="http://schemas.microsoft.com/office/drawing/2017/decorative" val="1"/>
+              </a:ext>
+            </a:extLst>
+          </p:cNvPr>
+          <p:cNvSpPr>
+            <a:spLocks noGrp="1" noRot="1" noChangeAspect="1" noMove="1" noResize="1" noEditPoints="1" noAdjustHandles="1" noChangeArrowheads="1" noChangeShapeType="1" noTextEdit="1"/>
+          </p:cNvSpPr>
+          <p:nvPr>
+            <p:extLst>
+              <p:ext uri="{386F3935-93C4-4BCD-93E2-E3B085C9AB24}">
+                <p16:designElem xmlns:p16="http://schemas.microsoft.com/office/powerpoint/2015/main" val="1"/>
+              </p:ext>
+            </p:extLst>
+          </p:nvPr>
+        </p:nvSpPr>
+        <p:spPr>
+          <a:xfrm>
+            <a:off x="643466" y="643466"/>
+            <a:ext cx="5364255" cy="2706794"/>
+          </a:xfrm>
+          <a:prstGeom prst="rect">
+            <a:avLst/>
+          </a:prstGeom>
+          <a:solidFill>
+            <a:srgbClr val="FFFFFF"/>
+          </a:solidFill>
+          <a:ln w="9525">
+            <a:noFill/>
+          </a:ln>
+          <a:effectLst>
+            <a:outerShdw blurRad="63500" dist="17780" dir="5400000" algn="t" rotWithShape="0">
+              <a:prstClr val="black">
+                <a:alpha val="43000"/>
+              </a:prstClr>
+            </a:outerShdw>
+          </a:effectLst>
+        </p:spPr>
+        <p:style>
+          <a:lnRef idx="2">
+            <a:schemeClr val="accent1">
+              <a:shade val="50000"/>
+            </a:schemeClr>
+          </a:lnRef>
+          <a:fillRef idx="1">
+            <a:schemeClr val="accent1"/>
+          </a:fillRef>
+          <a:effectRef idx="0">
+            <a:schemeClr val="accent1"/>
+          </a:effectRef>
+          <a:fontRef idx="minor">
+            <a:schemeClr val="lt1"/>
+          </a:fontRef>
+        </p:style>
+        <p:txBody>
+          <a:bodyPr rtlCol="0" anchor="ctr"/>
+          <a:lstStyle/>
+          <a:p>
+            <a:pPr algn="ctr"/>
+            <a:endParaRPr lang="en-US"/>
+          </a:p>
+        </p:txBody>
+      </p:sp>
       <p:pic>
         <p:nvPicPr>
-          <p:cNvPr id="11" name="Imagen 10" descr="Imagen que contiene dibujo, señal, firmar&#10;&#10;Descripción generada automáticamente">
-            <a:extLst>
-              <a:ext uri="{FF2B5EF4-FFF2-40B4-BE49-F238E27FC236}">
-                <a16:creationId xmlns:a16="http://schemas.microsoft.com/office/drawing/2014/main" id="{CD896502-054A-48A3-A5E7-13E38E92D7B9}"/>
+          <p:cNvPr id="1032" name="Picture 8" descr="Dibujo en blanco y negro&#10;&#10;Descripción generada automáticamente con confianza media">
+            <a:extLst>
+              <a:ext uri="{FF2B5EF4-FFF2-40B4-BE49-F238E27FC236}">
+                <a16:creationId xmlns:a16="http://schemas.microsoft.com/office/drawing/2014/main" id="{64EB4CCA-55B1-E895-A8B9-05352930852A}"/>
               </a:ext>
             </a:extLst>
           </p:cNvPr>
           <p:cNvPicPr>
-            <a:picLocks noChangeAspect="1"/>
+            <a:picLocks noChangeAspect="1" noChangeArrowheads="1"/>
           </p:cNvPicPr>
           <p:nvPr/>
         </p:nvPicPr>
@@ -4776,27 +4433,107 @@
             <a:fillRect/>
           </a:stretch>
         </p:blipFill>
-        <p:spPr>
-          <a:xfrm>
-            <a:off x="4068763" y="1122363"/>
-            <a:ext cx="1704975" cy="2133600"/>
-          </a:xfrm>
-          <a:prstGeom prst="rect">
-            <a:avLst/>
-          </a:prstGeom>
+        <p:spPr bwMode="auto">
+          <a:xfrm>
+            <a:off x="1493900" y="965200"/>
+            <a:ext cx="3662752" cy="2060298"/>
+          </a:xfrm>
+          <a:prstGeom prst="rect">
+            <a:avLst/>
+          </a:prstGeom>
+          <a:noFill/>
+          <a:extLst>
+            <a:ext uri="{909E8E84-426E-40DD-AFC4-6F175D3DCCD1}">
+              <a14:hiddenFill xmlns:a14="http://schemas.microsoft.com/office/drawing/2010/main">
+                <a:solidFill>
+                  <a:srgbClr val="FFFFFF"/>
+                </a:solidFill>
+              </a14:hiddenFill>
+            </a:ext>
+          </a:extLst>
         </p:spPr>
       </p:pic>
+      <p:sp>
+        <p:nvSpPr>
+          <p:cNvPr id="1062" name="Rectangle 1045">
+            <a:extLst>
+              <a:ext uri="{FF2B5EF4-FFF2-40B4-BE49-F238E27FC236}">
+                <a16:creationId xmlns:a16="http://schemas.microsoft.com/office/drawing/2014/main" id="{53059C5A-91CB-4024-9B4E-20082E25C70B}"/>
+              </a:ext>
+              <a:ext uri="{C183D7F6-B498-43B3-948B-1728B52AA6E4}">
+                <adec:decorative xmlns:adec="http://schemas.microsoft.com/office/drawing/2017/decorative" val="1"/>
+              </a:ext>
+            </a:extLst>
+          </p:cNvPr>
+          <p:cNvSpPr>
+            <a:spLocks noGrp="1" noRot="1" noChangeAspect="1" noMove="1" noResize="1" noEditPoints="1" noAdjustHandles="1" noChangeArrowheads="1" noChangeShapeType="1" noTextEdit="1"/>
+          </p:cNvSpPr>
+          <p:nvPr>
+            <p:extLst>
+              <p:ext uri="{386F3935-93C4-4BCD-93E2-E3B085C9AB24}">
+                <p16:designElem xmlns:p16="http://schemas.microsoft.com/office/powerpoint/2015/main" val="1"/>
+              </p:ext>
+            </p:extLst>
+          </p:nvPr>
+        </p:nvSpPr>
+        <p:spPr>
+          <a:xfrm>
+            <a:off x="6168589" y="643466"/>
+            <a:ext cx="5376806" cy="2706794"/>
+          </a:xfrm>
+          <a:prstGeom prst="rect">
+            <a:avLst/>
+          </a:prstGeom>
+          <a:solidFill>
+            <a:srgbClr val="FFFFFF"/>
+          </a:solidFill>
+          <a:ln w="9525">
+            <a:noFill/>
+          </a:ln>
+          <a:effectLst>
+            <a:outerShdw blurRad="63500" dist="17780" dir="5400000" algn="t" rotWithShape="0">
+              <a:prstClr val="black">
+                <a:alpha val="43000"/>
+              </a:prstClr>
+            </a:outerShdw>
+          </a:effectLst>
+        </p:spPr>
+        <p:style>
+          <a:lnRef idx="2">
+            <a:schemeClr val="accent1">
+              <a:shade val="50000"/>
+            </a:schemeClr>
+          </a:lnRef>
+          <a:fillRef idx="1">
+            <a:schemeClr val="accent1"/>
+          </a:fillRef>
+          <a:effectRef idx="0">
+            <a:schemeClr val="accent1"/>
+          </a:effectRef>
+          <a:fontRef idx="minor">
+            <a:schemeClr val="lt1"/>
+          </a:fontRef>
+        </p:style>
+        <p:txBody>
+          <a:bodyPr rtlCol="0" anchor="ctr"/>
+          <a:lstStyle/>
+          <a:p>
+            <a:pPr algn="ctr"/>
+            <a:endParaRPr lang="en-US"/>
+          </a:p>
+        </p:txBody>
+      </p:sp>
       <p:pic>
         <p:nvPicPr>
-          <p:cNvPr id="5" name="Imagen 4" descr="Logotipo, Icono&#10;&#10;Descripción generada automáticamente">
-            <a:extLst>
-              <a:ext uri="{FF2B5EF4-FFF2-40B4-BE49-F238E27FC236}">
-                <a16:creationId xmlns:a16="http://schemas.microsoft.com/office/drawing/2014/main" id="{2DEB0546-C6D5-4DB6-B340-A2F26B9DF3FA}"/>
+          <p:cNvPr id="1028" name="Picture 4" descr="Forma&#10;&#10;Descripción generada automáticamente con confianza media">
+            <a:extLst>
+              <a:ext uri="{FF2B5EF4-FFF2-40B4-BE49-F238E27FC236}">
+                <a16:creationId xmlns:a16="http://schemas.microsoft.com/office/drawing/2014/main" id="{C4CCB78D-B535-11D2-5C87-F648B2E76A66}"/>
               </a:ext>
             </a:extLst>
           </p:cNvPr>
           <p:cNvPicPr>
-            <a:picLocks noChangeAspect="1"/>
+            <a:picLocks noChangeAspect="1" noChangeArrowheads="1"/>
           </p:cNvPicPr>
           <p:nvPr/>
         </p:nvPicPr>
@@ -4812,27 +4549,107 @@
             <a:fillRect/>
           </a:stretch>
         </p:blipFill>
-        <p:spPr>
-          <a:xfrm>
-            <a:off x="5829300" y="1122363"/>
-            <a:ext cx="1038225" cy="1038225"/>
-          </a:xfrm>
-          <a:prstGeom prst="rect">
-            <a:avLst/>
-          </a:prstGeom>
+        <p:spPr bwMode="auto">
+          <a:xfrm>
+            <a:off x="6489680" y="1231995"/>
+            <a:ext cx="4733982" cy="1526708"/>
+          </a:xfrm>
+          <a:prstGeom prst="rect">
+            <a:avLst/>
+          </a:prstGeom>
+          <a:noFill/>
+          <a:extLst>
+            <a:ext uri="{909E8E84-426E-40DD-AFC4-6F175D3DCCD1}">
+              <a14:hiddenFill xmlns:a14="http://schemas.microsoft.com/office/drawing/2010/main">
+                <a:solidFill>
+                  <a:srgbClr val="FFFFFF"/>
+                </a:solidFill>
+              </a14:hiddenFill>
+            </a:ext>
+          </a:extLst>
         </p:spPr>
       </p:pic>
+      <p:sp>
+        <p:nvSpPr>
+          <p:cNvPr id="1063" name="Rectangle 1047">
+            <a:extLst>
+              <a:ext uri="{FF2B5EF4-FFF2-40B4-BE49-F238E27FC236}">
+                <a16:creationId xmlns:a16="http://schemas.microsoft.com/office/drawing/2014/main" id="{184884BF-A898-4EFF-9504-E13EBE3FF62E}"/>
+              </a:ext>
+              <a:ext uri="{C183D7F6-B498-43B3-948B-1728B52AA6E4}">
+                <adec:decorative xmlns:adec="http://schemas.microsoft.com/office/drawing/2017/decorative" val="1"/>
+              </a:ext>
+            </a:extLst>
+          </p:cNvPr>
+          <p:cNvSpPr>
+            <a:spLocks noGrp="1" noRot="1" noChangeAspect="1" noMove="1" noResize="1" noEditPoints="1" noAdjustHandles="1" noChangeArrowheads="1" noChangeShapeType="1" noTextEdit="1"/>
+          </p:cNvSpPr>
+          <p:nvPr>
+            <p:extLst>
+              <p:ext uri="{386F3935-93C4-4BCD-93E2-E3B085C9AB24}">
+                <p16:designElem xmlns:p16="http://schemas.microsoft.com/office/powerpoint/2015/main" val="1"/>
+              </p:ext>
+            </p:extLst>
+          </p:nvPr>
+        </p:nvSpPr>
+        <p:spPr>
+          <a:xfrm>
+            <a:off x="643466" y="3514513"/>
+            <a:ext cx="5364255" cy="2703406"/>
+          </a:xfrm>
+          <a:prstGeom prst="rect">
+            <a:avLst/>
+          </a:prstGeom>
+          <a:solidFill>
+            <a:srgbClr val="FFFFFF"/>
+          </a:solidFill>
+          <a:ln w="9525">
+            <a:noFill/>
+          </a:ln>
+          <a:effectLst>
+            <a:outerShdw blurRad="63500" dist="17780" dir="5400000" algn="t" rotWithShape="0">
+              <a:prstClr val="black">
+                <a:alpha val="43000"/>
+              </a:prstClr>
+            </a:outerShdw>
+          </a:effectLst>
+        </p:spPr>
+        <p:style>
+          <a:lnRef idx="2">
+            <a:schemeClr val="accent1">
+              <a:shade val="50000"/>
+            </a:schemeClr>
+          </a:lnRef>
+          <a:fillRef idx="1">
+            <a:schemeClr val="accent1"/>
+          </a:fillRef>
+          <a:effectRef idx="0">
+            <a:schemeClr val="accent1"/>
+          </a:effectRef>
+          <a:fontRef idx="minor">
+            <a:schemeClr val="lt1"/>
+          </a:fontRef>
+        </p:style>
+        <p:txBody>
+          <a:bodyPr rtlCol="0" anchor="ctr"/>
+          <a:lstStyle/>
+          <a:p>
+            <a:pPr algn="ctr"/>
+            <a:endParaRPr lang="en-US"/>
+          </a:p>
+        </p:txBody>
+      </p:sp>
       <p:pic>
         <p:nvPicPr>
-          <p:cNvPr id="13" name="Imagen 12" descr="Logotipo, Icono&#10;&#10;Descripción generada automáticamente">
-            <a:extLst>
-              <a:ext uri="{FF2B5EF4-FFF2-40B4-BE49-F238E27FC236}">
-                <a16:creationId xmlns:a16="http://schemas.microsoft.com/office/drawing/2014/main" id="{E6FC8D00-CD0F-42F9-98F6-B5953E3BA909}"/>
+          <p:cNvPr id="1030" name="Picture 6" descr="Icono&#10;&#10;Descripción generada automáticamente">
+            <a:extLst>
+              <a:ext uri="{FF2B5EF4-FFF2-40B4-BE49-F238E27FC236}">
+                <a16:creationId xmlns:a16="http://schemas.microsoft.com/office/drawing/2014/main" id="{B58E20E4-0ACB-3C31-31B8-B8DFFCF3509D}"/>
               </a:ext>
             </a:extLst>
           </p:cNvPr>
           <p:cNvPicPr>
-            <a:picLocks noChangeAspect="1"/>
+            <a:picLocks noChangeAspect="1" noChangeArrowheads="1"/>
           </p:cNvPicPr>
           <p:nvPr/>
         </p:nvPicPr>
@@ -4848,27 +4665,107 @@
             <a:fillRect/>
           </a:stretch>
         </p:blipFill>
-        <p:spPr>
-          <a:xfrm>
-            <a:off x="5829300" y="2216150"/>
-            <a:ext cx="1038225" cy="1038225"/>
-          </a:xfrm>
-          <a:prstGeom prst="rect">
-            <a:avLst/>
-          </a:prstGeom>
+        <p:spPr bwMode="auto">
+          <a:xfrm>
+            <a:off x="965201" y="4144463"/>
+            <a:ext cx="3866106" cy="1179163"/>
+          </a:xfrm>
+          <a:prstGeom prst="rect">
+            <a:avLst/>
+          </a:prstGeom>
+          <a:noFill/>
+          <a:extLst>
+            <a:ext uri="{909E8E84-426E-40DD-AFC4-6F175D3DCCD1}">
+              <a14:hiddenFill xmlns:a14="http://schemas.microsoft.com/office/drawing/2010/main">
+                <a:solidFill>
+                  <a:srgbClr val="FFFFFF"/>
+                </a:solidFill>
+              </a14:hiddenFill>
+            </a:ext>
+          </a:extLst>
         </p:spPr>
       </p:pic>
+      <p:sp>
+        <p:nvSpPr>
+          <p:cNvPr id="1064" name="Rectangle 1049">
+            <a:extLst>
+              <a:ext uri="{FF2B5EF4-FFF2-40B4-BE49-F238E27FC236}">
+                <a16:creationId xmlns:a16="http://schemas.microsoft.com/office/drawing/2014/main" id="{7B32D337-FDA6-4468-ADB1-7038E5FC0BA9}"/>
+              </a:ext>
+              <a:ext uri="{C183D7F6-B498-43B3-948B-1728B52AA6E4}">
+                <adec:decorative xmlns:adec="http://schemas.microsoft.com/office/drawing/2017/decorative" val="1"/>
+              </a:ext>
+            </a:extLst>
+          </p:cNvPr>
+          <p:cNvSpPr>
+            <a:spLocks noGrp="1" noRot="1" noChangeAspect="1" noMove="1" noResize="1" noEditPoints="1" noAdjustHandles="1" noChangeArrowheads="1" noChangeShapeType="1" noTextEdit="1"/>
+          </p:cNvSpPr>
+          <p:nvPr>
+            <p:extLst>
+              <p:ext uri="{386F3935-93C4-4BCD-93E2-E3B085C9AB24}">
+                <p16:designElem xmlns:p16="http://schemas.microsoft.com/office/powerpoint/2015/main" val="1"/>
+              </p:ext>
+            </p:extLst>
+          </p:nvPr>
+        </p:nvSpPr>
+        <p:spPr>
+          <a:xfrm>
+            <a:off x="6168589" y="3514513"/>
+            <a:ext cx="5376806" cy="2706794"/>
+          </a:xfrm>
+          <a:prstGeom prst="rect">
+            <a:avLst/>
+          </a:prstGeom>
+          <a:solidFill>
+            <a:srgbClr val="FFFFFF"/>
+          </a:solidFill>
+          <a:ln w="9525">
+            <a:noFill/>
+          </a:ln>
+          <a:effectLst>
+            <a:outerShdw blurRad="63500" dist="17780" dir="5400000" algn="t" rotWithShape="0">
+              <a:prstClr val="black">
+                <a:alpha val="43000"/>
+              </a:prstClr>
+            </a:outerShdw>
+          </a:effectLst>
+        </p:spPr>
+        <p:style>
+          <a:lnRef idx="2">
+            <a:schemeClr val="accent1">
+              <a:shade val="50000"/>
+            </a:schemeClr>
+          </a:lnRef>
+          <a:fillRef idx="1">
+            <a:schemeClr val="accent1"/>
+          </a:fillRef>
+          <a:effectRef idx="0">
+            <a:schemeClr val="accent1"/>
+          </a:effectRef>
+          <a:fontRef idx="minor">
+            <a:schemeClr val="lt1"/>
+          </a:fontRef>
+        </p:style>
+        <p:txBody>
+          <a:bodyPr rtlCol="0" anchor="ctr"/>
+          <a:lstStyle/>
+          <a:p>
+            <a:pPr algn="ctr"/>
+            <a:endParaRPr lang="en-US"/>
+          </a:p>
+        </p:txBody>
+      </p:sp>
       <p:pic>
         <p:nvPicPr>
-          <p:cNvPr id="15" name="Imagen 14" descr="Logotipo&#10;&#10;Descripción generada automáticamente con confianza media">
-            <a:extLst>
-              <a:ext uri="{FF2B5EF4-FFF2-40B4-BE49-F238E27FC236}">
-                <a16:creationId xmlns:a16="http://schemas.microsoft.com/office/drawing/2014/main" id="{656FF758-9DB9-4F43-A52B-2E9036F61BF0}"/>
+          <p:cNvPr id="1026" name="Picture 2" descr="Qué es SonarQube? – Blog QuantiKa14">
+            <a:extLst>
+              <a:ext uri="{FF2B5EF4-FFF2-40B4-BE49-F238E27FC236}">
+                <a16:creationId xmlns:a16="http://schemas.microsoft.com/office/drawing/2014/main" id="{5FFE794D-B6DC-5EDF-08FC-86FB21D6A766}"/>
               </a:ext>
             </a:extLst>
           </p:cNvPr>
           <p:cNvPicPr>
-            <a:picLocks noChangeAspect="1"/>
+            <a:picLocks noChangeAspect="1" noChangeArrowheads="1"/>
           </p:cNvPicPr>
           <p:nvPr/>
         </p:nvPicPr>
@@ -4884,128 +4781,30 @@
             <a:fillRect/>
           </a:stretch>
         </p:blipFill>
-        <p:spPr>
-          <a:xfrm>
-            <a:off x="4068763" y="3311525"/>
-            <a:ext cx="2798763" cy="1068388"/>
-          </a:xfrm>
-          <a:prstGeom prst="rect">
-            <a:avLst/>
-          </a:prstGeom>
-        </p:spPr>
-      </p:pic>
-      <p:pic>
-        <p:nvPicPr>
-          <p:cNvPr id="17" name="Imagen 16" descr="Un dibujo con letras&#10;&#10;Descripción generada automáticamente con confianza baja">
-            <a:extLst>
-              <a:ext uri="{FF2B5EF4-FFF2-40B4-BE49-F238E27FC236}">
-                <a16:creationId xmlns:a16="http://schemas.microsoft.com/office/drawing/2014/main" id="{7C8E036E-72D5-47BF-8AEA-A3B7046E4F4B}"/>
-              </a:ext>
-            </a:extLst>
-          </p:cNvPr>
-          <p:cNvPicPr>
-            <a:picLocks noChangeAspect="1"/>
-          </p:cNvPicPr>
-          <p:nvPr/>
-        </p:nvPicPr>
-        <p:blipFill>
-          <a:blip r:embed="rId6">
-            <a:extLst>
-              <a:ext uri="{28A0092B-C50C-407E-A947-70E740481C1C}">
-                <a14:useLocalDpi xmlns:a14="http://schemas.microsoft.com/office/drawing/2010/main" val="0"/>
-              </a:ext>
-            </a:extLst>
-          </a:blip>
-          <a:stretch>
-            <a:fillRect/>
-          </a:stretch>
-        </p:blipFill>
-        <p:spPr>
-          <a:xfrm>
-            <a:off x="6924675" y="1122363"/>
-            <a:ext cx="4137025" cy="1997075"/>
-          </a:xfrm>
-          <a:prstGeom prst="rect">
-            <a:avLst/>
-          </a:prstGeom>
-        </p:spPr>
-      </p:pic>
-      <p:pic>
-        <p:nvPicPr>
-          <p:cNvPr id="37" name="Imagen 36" descr="Logotipo&#10;&#10;Descripción generada automáticamente">
-            <a:extLst>
-              <a:ext uri="{FF2B5EF4-FFF2-40B4-BE49-F238E27FC236}">
-                <a16:creationId xmlns:a16="http://schemas.microsoft.com/office/drawing/2014/main" id="{8C28EE67-11B5-4F74-A119-118E9CE2E195}"/>
-              </a:ext>
-            </a:extLst>
-          </p:cNvPr>
-          <p:cNvPicPr>
-            <a:picLocks noChangeAspect="1"/>
-          </p:cNvPicPr>
-          <p:nvPr/>
-        </p:nvPicPr>
-        <p:blipFill>
-          <a:blip r:embed="rId7">
-            <a:extLst>
-              <a:ext uri="{28A0092B-C50C-407E-A947-70E740481C1C}">
-                <a14:useLocalDpi xmlns:a14="http://schemas.microsoft.com/office/drawing/2010/main" val="0"/>
-              </a:ext>
-            </a:extLst>
-          </a:blip>
-          <a:stretch>
-            <a:fillRect/>
-          </a:stretch>
-        </p:blipFill>
-        <p:spPr>
-          <a:xfrm>
-            <a:off x="6924675" y="3175000"/>
-            <a:ext cx="4137025" cy="1206500"/>
-          </a:xfrm>
-          <a:prstGeom prst="rect">
-            <a:avLst/>
-          </a:prstGeom>
-        </p:spPr>
-      </p:pic>
-      <p:pic>
-        <p:nvPicPr>
-          <p:cNvPr id="19" name="Imagen 18" descr="Imagen que contiene dibujo&#10;&#10;Descripción generada automáticamente">
-            <a:extLst>
-              <a:ext uri="{FF2B5EF4-FFF2-40B4-BE49-F238E27FC236}">
-                <a16:creationId xmlns:a16="http://schemas.microsoft.com/office/drawing/2014/main" id="{3C6D69BC-A7E6-43E4-BA32-CABCD8F4A2CD}"/>
-              </a:ext>
-            </a:extLst>
-          </p:cNvPr>
-          <p:cNvPicPr>
-            <a:picLocks noChangeAspect="1"/>
-          </p:cNvPicPr>
-          <p:nvPr/>
-        </p:nvPicPr>
-        <p:blipFill>
-          <a:blip r:embed="rId8">
-            <a:extLst>
-              <a:ext uri="{28A0092B-C50C-407E-A947-70E740481C1C}">
-                <a14:useLocalDpi xmlns:a14="http://schemas.microsoft.com/office/drawing/2010/main" val="0"/>
-              </a:ext>
-            </a:extLst>
-          </a:blip>
-          <a:stretch>
-            <a:fillRect/>
-          </a:stretch>
-        </p:blipFill>
-        <p:spPr>
-          <a:xfrm>
-            <a:off x="4068763" y="4437063"/>
-            <a:ext cx="6991350" cy="1287463"/>
-          </a:xfrm>
-          <a:prstGeom prst="rect">
-            <a:avLst/>
-          </a:prstGeom>
+        <p:spPr bwMode="auto">
+          <a:xfrm>
+            <a:off x="6489680" y="4208898"/>
+            <a:ext cx="4733982" cy="1314995"/>
+          </a:xfrm>
+          <a:prstGeom prst="rect">
+            <a:avLst/>
+          </a:prstGeom>
+          <a:noFill/>
+          <a:extLst>
+            <a:ext uri="{909E8E84-426E-40DD-AFC4-6F175D3DCCD1}">
+              <a14:hiddenFill xmlns:a14="http://schemas.microsoft.com/office/drawing/2010/main">
+                <a:solidFill>
+                  <a:srgbClr val="FFFFFF"/>
+                </a:solidFill>
+              </a14:hiddenFill>
+            </a:ext>
+          </a:extLst>
         </p:spPr>
       </p:pic>
     </p:spTree>
     <p:extLst>
       <p:ext uri="{BB962C8B-B14F-4D97-AF65-F5344CB8AC3E}">
-        <p14:creationId xmlns:p14="http://schemas.microsoft.com/office/powerpoint/2010/main" val="1164339323"/>
+        <p14:creationId xmlns:p14="http://schemas.microsoft.com/office/powerpoint/2010/main" val="1096323304"/>
       </p:ext>
     </p:extLst>
   </p:cSld>
@@ -5040,48 +4839,12 @@
           <a:chExt cx="0" cy="0"/>
         </a:xfrm>
       </p:grpSpPr>
-      <p:pic>
-        <p:nvPicPr>
-          <p:cNvPr id="5" name="Imagen 4" descr="Logotipo, nombre de la empresa&#10;&#10;Descripción generada automáticamente">
-            <a:extLst>
-              <a:ext uri="{FF2B5EF4-FFF2-40B4-BE49-F238E27FC236}">
-                <a16:creationId xmlns:a16="http://schemas.microsoft.com/office/drawing/2014/main" id="{88CB2057-FF68-4870-BB98-1F8DE164F748}"/>
-              </a:ext>
-            </a:extLst>
-          </p:cNvPr>
-          <p:cNvPicPr>
-            <a:picLocks noChangeAspect="1"/>
-          </p:cNvPicPr>
-          <p:nvPr/>
-        </p:nvPicPr>
-        <p:blipFill>
-          <a:blip r:embed="rId2">
-            <a:extLst>
-              <a:ext uri="{28A0092B-C50C-407E-A947-70E740481C1C}">
-                <a14:useLocalDpi xmlns:a14="http://schemas.microsoft.com/office/drawing/2010/main" val="0"/>
-              </a:ext>
-            </a:extLst>
-          </a:blip>
-          <a:stretch>
-            <a:fillRect/>
-          </a:stretch>
-        </p:blipFill>
-        <p:spPr>
-          <a:xfrm>
-            <a:off x="1115616" y="1382129"/>
-            <a:ext cx="3292524" cy="1545952"/>
-          </a:xfrm>
-          <a:prstGeom prst="rect">
-            <a:avLst/>
-          </a:prstGeom>
-        </p:spPr>
-      </p:pic>
       <p:cxnSp>
         <p:nvCxnSpPr>
-          <p:cNvPr id="22" name="Straight Connector 13">
-            <a:extLst>
-              <a:ext uri="{FF2B5EF4-FFF2-40B4-BE49-F238E27FC236}">
-                <a16:creationId xmlns:a16="http://schemas.microsoft.com/office/drawing/2014/main" id="{D4BDCD00-BA97-40D8-93CD-0A9CA931BE17}"/>
+          <p:cNvPr id="42" name="Straight Connector 41">
+            <a:extLst>
+              <a:ext uri="{FF2B5EF4-FFF2-40B4-BE49-F238E27FC236}">
+                <a16:creationId xmlns:a16="http://schemas.microsoft.com/office/drawing/2014/main" id="{22F6364A-B358-4BEE-B158-0734D2C938D4}"/>
               </a:ext>
               <a:ext uri="{C183D7F6-B498-43B3-948B-1728B52AA6E4}">
                 <adec:decorative xmlns:adec="http://schemas.microsoft.com/office/drawing/2017/decorative" val="1"/>
@@ -5101,15 +4864,15 @@
         </p:nvCxnSpPr>
         <p:spPr>
           <a:xfrm>
-            <a:off x="1402080" y="3429000"/>
-            <a:ext cx="2636520" cy="0"/>
+            <a:off x="3738202" y="1570814"/>
+            <a:ext cx="0" cy="3710227"/>
           </a:xfrm>
           <a:prstGeom prst="line">
             <a:avLst/>
           </a:prstGeom>
           <a:ln w="19050">
             <a:solidFill>
-              <a:srgbClr val="7F7F7F"/>
+              <a:srgbClr val="08B6DF"/>
             </a:solidFill>
           </a:ln>
         </p:spPr>
@@ -5130,10 +4893,46 @@
       </p:cxnSp>
       <p:pic>
         <p:nvPicPr>
-          <p:cNvPr id="7" name="Imagen 6" descr="Logotipo, nombre de la empresa&#10;&#10;Descripción generada automáticamente">
-            <a:extLst>
-              <a:ext uri="{FF2B5EF4-FFF2-40B4-BE49-F238E27FC236}">
-                <a16:creationId xmlns:a16="http://schemas.microsoft.com/office/drawing/2014/main" id="{3DBEA7B3-F15E-46E2-85D2-B0C34AE7A807}"/>
+          <p:cNvPr id="11" name="Imagen 10" descr="Imagen que contiene dibujo, señal, firmar&#10;&#10;Descripción generada automáticamente">
+            <a:extLst>
+              <a:ext uri="{FF2B5EF4-FFF2-40B4-BE49-F238E27FC236}">
+                <a16:creationId xmlns:a16="http://schemas.microsoft.com/office/drawing/2014/main" id="{CD896502-054A-48A3-A5E7-13E38E92D7B9}"/>
+              </a:ext>
+            </a:extLst>
+          </p:cNvPr>
+          <p:cNvPicPr>
+            <a:picLocks noChangeAspect="1"/>
+          </p:cNvPicPr>
+          <p:nvPr/>
+        </p:nvPicPr>
+        <p:blipFill>
+          <a:blip r:embed="rId2">
+            <a:extLst>
+              <a:ext uri="{28A0092B-C50C-407E-A947-70E740481C1C}">
+                <a14:useLocalDpi xmlns:a14="http://schemas.microsoft.com/office/drawing/2010/main" val="0"/>
+              </a:ext>
+            </a:extLst>
+          </a:blip>
+          <a:stretch>
+            <a:fillRect/>
+          </a:stretch>
+        </p:blipFill>
+        <p:spPr>
+          <a:xfrm>
+            <a:off x="4068763" y="1122363"/>
+            <a:ext cx="1704975" cy="2133600"/>
+          </a:xfrm>
+          <a:prstGeom prst="rect">
+            <a:avLst/>
+          </a:prstGeom>
+        </p:spPr>
+      </p:pic>
+      <p:pic>
+        <p:nvPicPr>
+          <p:cNvPr id="5" name="Imagen 4" descr="Logotipo, Icono&#10;&#10;Descripción generada automáticamente">
+            <a:extLst>
+              <a:ext uri="{FF2B5EF4-FFF2-40B4-BE49-F238E27FC236}">
+                <a16:creationId xmlns:a16="http://schemas.microsoft.com/office/drawing/2014/main" id="{2DEB0546-C6D5-4DB6-B340-A2F26B9DF3FA}"/>
               </a:ext>
             </a:extLst>
           </p:cNvPr>
@@ -5156,72 +4955,20 @@
         </p:blipFill>
         <p:spPr>
           <a:xfrm>
-            <a:off x="1129115" y="3880065"/>
-            <a:ext cx="3279025" cy="1639512"/>
+            <a:off x="5829300" y="1122363"/>
+            <a:ext cx="1038225" cy="1038225"/>
           </a:xfrm>
           <a:prstGeom prst="rect">
             <a:avLst/>
           </a:prstGeom>
         </p:spPr>
       </p:pic>
-      <p:cxnSp>
-        <p:nvCxnSpPr>
-          <p:cNvPr id="23" name="Straight Connector 15">
-            <a:extLst>
-              <a:ext uri="{FF2B5EF4-FFF2-40B4-BE49-F238E27FC236}">
-                <a16:creationId xmlns:a16="http://schemas.microsoft.com/office/drawing/2014/main" id="{2D631E40-F51C-4828-B23B-DF903513296E}"/>
-              </a:ext>
-              <a:ext uri="{C183D7F6-B498-43B3-948B-1728B52AA6E4}">
-                <adec:decorative xmlns:adec="http://schemas.microsoft.com/office/drawing/2017/decorative" val="1"/>
-              </a:ext>
-            </a:extLst>
-          </p:cNvPr>
-          <p:cNvCxnSpPr>
-            <a:cxnSpLocks noGrp="1" noRot="1" noChangeAspect="1" noMove="1" noResize="1" noEditPoints="1" noAdjustHandles="1" noChangeArrowheads="1" noChangeShapeType="1"/>
-          </p:cNvCxnSpPr>
-          <p:nvPr>
-            <p:extLst>
-              <p:ext uri="{386F3935-93C4-4BCD-93E2-E3B085C9AB24}">
-                <p16:designElem xmlns:p16="http://schemas.microsoft.com/office/powerpoint/2015/main" val="1"/>
-              </p:ext>
-            </p:extLst>
-          </p:nvPr>
-        </p:nvCxnSpPr>
-        <p:spPr>
-          <a:xfrm>
-            <a:off x="4654296" y="1573887"/>
-            <a:ext cx="0" cy="3710227"/>
-          </a:xfrm>
-          <a:prstGeom prst="line">
-            <a:avLst/>
-          </a:prstGeom>
-          <a:ln w="19050">
-            <a:solidFill>
-              <a:srgbClr val="7F7F7F"/>
-            </a:solidFill>
-          </a:ln>
-        </p:spPr>
-        <p:style>
-          <a:lnRef idx="1">
-            <a:schemeClr val="accent1"/>
-          </a:lnRef>
-          <a:fillRef idx="0">
-            <a:schemeClr val="accent1"/>
-          </a:fillRef>
-          <a:effectRef idx="0">
-            <a:schemeClr val="accent1"/>
-          </a:effectRef>
-          <a:fontRef idx="minor">
-            <a:schemeClr val="tx1"/>
-          </a:fontRef>
-        </p:style>
-      </p:cxnSp>
       <p:pic>
         <p:nvPicPr>
-          <p:cNvPr id="9" name="Imagen 8" descr="Logotipo, nombre de la empresa&#10;&#10;Descripción generada automáticamente">
-            <a:extLst>
-              <a:ext uri="{FF2B5EF4-FFF2-40B4-BE49-F238E27FC236}">
-                <a16:creationId xmlns:a16="http://schemas.microsoft.com/office/drawing/2014/main" id="{B9540663-5CAB-4C8A-8941-A05FE8E568B8}"/>
+          <p:cNvPr id="13" name="Imagen 12" descr="Logotipo, Icono&#10;&#10;Descripción generada automáticamente">
+            <a:extLst>
+              <a:ext uri="{FF2B5EF4-FFF2-40B4-BE49-F238E27FC236}">
+                <a16:creationId xmlns:a16="http://schemas.microsoft.com/office/drawing/2014/main" id="{E6FC8D00-CD0F-42F9-98F6-B5953E3BA909}"/>
               </a:ext>
             </a:extLst>
           </p:cNvPr>
@@ -5244,8 +4991,152 @@
         </p:blipFill>
         <p:spPr>
           <a:xfrm>
-            <a:off x="4878305" y="1492926"/>
-            <a:ext cx="6184580" cy="4026651"/>
+            <a:off x="5829300" y="2216150"/>
+            <a:ext cx="1038225" cy="1038225"/>
+          </a:xfrm>
+          <a:prstGeom prst="rect">
+            <a:avLst/>
+          </a:prstGeom>
+        </p:spPr>
+      </p:pic>
+      <p:pic>
+        <p:nvPicPr>
+          <p:cNvPr id="15" name="Imagen 14" descr="Logotipo&#10;&#10;Descripción generada automáticamente con confianza media">
+            <a:extLst>
+              <a:ext uri="{FF2B5EF4-FFF2-40B4-BE49-F238E27FC236}">
+                <a16:creationId xmlns:a16="http://schemas.microsoft.com/office/drawing/2014/main" id="{656FF758-9DB9-4F43-A52B-2E9036F61BF0}"/>
+              </a:ext>
+            </a:extLst>
+          </p:cNvPr>
+          <p:cNvPicPr>
+            <a:picLocks noChangeAspect="1"/>
+          </p:cNvPicPr>
+          <p:nvPr/>
+        </p:nvPicPr>
+        <p:blipFill>
+          <a:blip r:embed="rId5">
+            <a:extLst>
+              <a:ext uri="{28A0092B-C50C-407E-A947-70E740481C1C}">
+                <a14:useLocalDpi xmlns:a14="http://schemas.microsoft.com/office/drawing/2010/main" val="0"/>
+              </a:ext>
+            </a:extLst>
+          </a:blip>
+          <a:stretch>
+            <a:fillRect/>
+          </a:stretch>
+        </p:blipFill>
+        <p:spPr>
+          <a:xfrm>
+            <a:off x="4068763" y="3311525"/>
+            <a:ext cx="2798763" cy="1068388"/>
+          </a:xfrm>
+          <a:prstGeom prst="rect">
+            <a:avLst/>
+          </a:prstGeom>
+        </p:spPr>
+      </p:pic>
+      <p:pic>
+        <p:nvPicPr>
+          <p:cNvPr id="17" name="Imagen 16" descr="Un dibujo con letras&#10;&#10;Descripción generada automáticamente con confianza baja">
+            <a:extLst>
+              <a:ext uri="{FF2B5EF4-FFF2-40B4-BE49-F238E27FC236}">
+                <a16:creationId xmlns:a16="http://schemas.microsoft.com/office/drawing/2014/main" id="{7C8E036E-72D5-47BF-8AEA-A3B7046E4F4B}"/>
+              </a:ext>
+            </a:extLst>
+          </p:cNvPr>
+          <p:cNvPicPr>
+            <a:picLocks noChangeAspect="1"/>
+          </p:cNvPicPr>
+          <p:nvPr/>
+        </p:nvPicPr>
+        <p:blipFill>
+          <a:blip r:embed="rId6">
+            <a:extLst>
+              <a:ext uri="{28A0092B-C50C-407E-A947-70E740481C1C}">
+                <a14:useLocalDpi xmlns:a14="http://schemas.microsoft.com/office/drawing/2010/main" val="0"/>
+              </a:ext>
+            </a:extLst>
+          </a:blip>
+          <a:stretch>
+            <a:fillRect/>
+          </a:stretch>
+        </p:blipFill>
+        <p:spPr>
+          <a:xfrm>
+            <a:off x="6924675" y="1122363"/>
+            <a:ext cx="4137025" cy="1997075"/>
+          </a:xfrm>
+          <a:prstGeom prst="rect">
+            <a:avLst/>
+          </a:prstGeom>
+        </p:spPr>
+      </p:pic>
+      <p:pic>
+        <p:nvPicPr>
+          <p:cNvPr id="37" name="Imagen 36" descr="Logotipo&#10;&#10;Descripción generada automáticamente">
+            <a:extLst>
+              <a:ext uri="{FF2B5EF4-FFF2-40B4-BE49-F238E27FC236}">
+                <a16:creationId xmlns:a16="http://schemas.microsoft.com/office/drawing/2014/main" id="{8C28EE67-11B5-4F74-A119-118E9CE2E195}"/>
+              </a:ext>
+            </a:extLst>
+          </p:cNvPr>
+          <p:cNvPicPr>
+            <a:picLocks noChangeAspect="1"/>
+          </p:cNvPicPr>
+          <p:nvPr/>
+        </p:nvPicPr>
+        <p:blipFill>
+          <a:blip r:embed="rId7">
+            <a:extLst>
+              <a:ext uri="{28A0092B-C50C-407E-A947-70E740481C1C}">
+                <a14:useLocalDpi xmlns:a14="http://schemas.microsoft.com/office/drawing/2010/main" val="0"/>
+              </a:ext>
+            </a:extLst>
+          </a:blip>
+          <a:stretch>
+            <a:fillRect/>
+          </a:stretch>
+        </p:blipFill>
+        <p:spPr>
+          <a:xfrm>
+            <a:off x="6924675" y="3175000"/>
+            <a:ext cx="4137025" cy="1206500"/>
+          </a:xfrm>
+          <a:prstGeom prst="rect">
+            <a:avLst/>
+          </a:prstGeom>
+        </p:spPr>
+      </p:pic>
+      <p:pic>
+        <p:nvPicPr>
+          <p:cNvPr id="19" name="Imagen 18" descr="Imagen que contiene dibujo&#10;&#10;Descripción generada automáticamente">
+            <a:extLst>
+              <a:ext uri="{FF2B5EF4-FFF2-40B4-BE49-F238E27FC236}">
+                <a16:creationId xmlns:a16="http://schemas.microsoft.com/office/drawing/2014/main" id="{3C6D69BC-A7E6-43E4-BA32-CABCD8F4A2CD}"/>
+              </a:ext>
+            </a:extLst>
+          </p:cNvPr>
+          <p:cNvPicPr>
+            <a:picLocks noChangeAspect="1"/>
+          </p:cNvPicPr>
+          <p:nvPr/>
+        </p:nvPicPr>
+        <p:blipFill>
+          <a:blip r:embed="rId8">
+            <a:extLst>
+              <a:ext uri="{28A0092B-C50C-407E-A947-70E740481C1C}">
+                <a14:useLocalDpi xmlns:a14="http://schemas.microsoft.com/office/drawing/2010/main" val="0"/>
+              </a:ext>
+            </a:extLst>
+          </a:blip>
+          <a:stretch>
+            <a:fillRect/>
+          </a:stretch>
+        </p:blipFill>
+        <p:spPr>
+          <a:xfrm>
+            <a:off x="4068763" y="4437063"/>
+            <a:ext cx="6991350" cy="1287463"/>
           </a:xfrm>
           <a:prstGeom prst="rect">
             <a:avLst/>
@@ -5255,7 +5146,7 @@
     </p:spTree>
     <p:extLst>
       <p:ext uri="{BB962C8B-B14F-4D97-AF65-F5344CB8AC3E}">
-        <p14:creationId xmlns:p14="http://schemas.microsoft.com/office/powerpoint/2010/main" val="2679615039"/>
+        <p14:creationId xmlns:p14="http://schemas.microsoft.com/office/powerpoint/2010/main" val="1164339323"/>
       </p:ext>
     </p:extLst>
   </p:cSld>
@@ -5292,6 +5183,256 @@
       </p:grpSpPr>
       <p:pic>
         <p:nvPicPr>
+          <p:cNvPr id="5" name="Imagen 4" descr="Logotipo, nombre de la empresa&#10;&#10;Descripción generada automáticamente">
+            <a:extLst>
+              <a:ext uri="{FF2B5EF4-FFF2-40B4-BE49-F238E27FC236}">
+                <a16:creationId xmlns:a16="http://schemas.microsoft.com/office/drawing/2014/main" id="{88CB2057-FF68-4870-BB98-1F8DE164F748}"/>
+              </a:ext>
+            </a:extLst>
+          </p:cNvPr>
+          <p:cNvPicPr>
+            <a:picLocks noChangeAspect="1"/>
+          </p:cNvPicPr>
+          <p:nvPr/>
+        </p:nvPicPr>
+        <p:blipFill>
+          <a:blip r:embed="rId2">
+            <a:extLst>
+              <a:ext uri="{28A0092B-C50C-407E-A947-70E740481C1C}">
+                <a14:useLocalDpi xmlns:a14="http://schemas.microsoft.com/office/drawing/2010/main" val="0"/>
+              </a:ext>
+            </a:extLst>
+          </a:blip>
+          <a:stretch>
+            <a:fillRect/>
+          </a:stretch>
+        </p:blipFill>
+        <p:spPr>
+          <a:xfrm>
+            <a:off x="1115616" y="1382129"/>
+            <a:ext cx="3292524" cy="1545952"/>
+          </a:xfrm>
+          <a:prstGeom prst="rect">
+            <a:avLst/>
+          </a:prstGeom>
+        </p:spPr>
+      </p:pic>
+      <p:cxnSp>
+        <p:nvCxnSpPr>
+          <p:cNvPr id="22" name="Straight Connector 13">
+            <a:extLst>
+              <a:ext uri="{FF2B5EF4-FFF2-40B4-BE49-F238E27FC236}">
+                <a16:creationId xmlns:a16="http://schemas.microsoft.com/office/drawing/2014/main" id="{D4BDCD00-BA97-40D8-93CD-0A9CA931BE17}"/>
+              </a:ext>
+              <a:ext uri="{C183D7F6-B498-43B3-948B-1728B52AA6E4}">
+                <adec:decorative xmlns:adec="http://schemas.microsoft.com/office/drawing/2017/decorative" val="1"/>
+              </a:ext>
+            </a:extLst>
+          </p:cNvPr>
+          <p:cNvCxnSpPr>
+            <a:cxnSpLocks noGrp="1" noRot="1" noChangeAspect="1" noMove="1" noResize="1" noEditPoints="1" noAdjustHandles="1" noChangeArrowheads="1" noChangeShapeType="1"/>
+          </p:cNvCxnSpPr>
+          <p:nvPr>
+            <p:extLst>
+              <p:ext uri="{386F3935-93C4-4BCD-93E2-E3B085C9AB24}">
+                <p16:designElem xmlns:p16="http://schemas.microsoft.com/office/powerpoint/2015/main" val="1"/>
+              </p:ext>
+            </p:extLst>
+          </p:nvPr>
+        </p:nvCxnSpPr>
+        <p:spPr>
+          <a:xfrm>
+            <a:off x="1402080" y="3429000"/>
+            <a:ext cx="2636520" cy="0"/>
+          </a:xfrm>
+          <a:prstGeom prst="line">
+            <a:avLst/>
+          </a:prstGeom>
+          <a:ln w="19050">
+            <a:solidFill>
+              <a:srgbClr val="7F7F7F"/>
+            </a:solidFill>
+          </a:ln>
+        </p:spPr>
+        <p:style>
+          <a:lnRef idx="1">
+            <a:schemeClr val="accent1"/>
+          </a:lnRef>
+          <a:fillRef idx="0">
+            <a:schemeClr val="accent1"/>
+          </a:fillRef>
+          <a:effectRef idx="0">
+            <a:schemeClr val="accent1"/>
+          </a:effectRef>
+          <a:fontRef idx="minor">
+            <a:schemeClr val="tx1"/>
+          </a:fontRef>
+        </p:style>
+      </p:cxnSp>
+      <p:pic>
+        <p:nvPicPr>
+          <p:cNvPr id="7" name="Imagen 6" descr="Logotipo, nombre de la empresa&#10;&#10;Descripción generada automáticamente">
+            <a:extLst>
+              <a:ext uri="{FF2B5EF4-FFF2-40B4-BE49-F238E27FC236}">
+                <a16:creationId xmlns:a16="http://schemas.microsoft.com/office/drawing/2014/main" id="{3DBEA7B3-F15E-46E2-85D2-B0C34AE7A807}"/>
+              </a:ext>
+            </a:extLst>
+          </p:cNvPr>
+          <p:cNvPicPr>
+            <a:picLocks noChangeAspect="1"/>
+          </p:cNvPicPr>
+          <p:nvPr/>
+        </p:nvPicPr>
+        <p:blipFill>
+          <a:blip r:embed="rId3">
+            <a:extLst>
+              <a:ext uri="{28A0092B-C50C-407E-A947-70E740481C1C}">
+                <a14:useLocalDpi xmlns:a14="http://schemas.microsoft.com/office/drawing/2010/main" val="0"/>
+              </a:ext>
+            </a:extLst>
+          </a:blip>
+          <a:stretch>
+            <a:fillRect/>
+          </a:stretch>
+        </p:blipFill>
+        <p:spPr>
+          <a:xfrm>
+            <a:off x="1129115" y="3880065"/>
+            <a:ext cx="3279025" cy="1639512"/>
+          </a:xfrm>
+          <a:prstGeom prst="rect">
+            <a:avLst/>
+          </a:prstGeom>
+        </p:spPr>
+      </p:pic>
+      <p:cxnSp>
+        <p:nvCxnSpPr>
+          <p:cNvPr id="23" name="Straight Connector 15">
+            <a:extLst>
+              <a:ext uri="{FF2B5EF4-FFF2-40B4-BE49-F238E27FC236}">
+                <a16:creationId xmlns:a16="http://schemas.microsoft.com/office/drawing/2014/main" id="{2D631E40-F51C-4828-B23B-DF903513296E}"/>
+              </a:ext>
+              <a:ext uri="{C183D7F6-B498-43B3-948B-1728B52AA6E4}">
+                <adec:decorative xmlns:adec="http://schemas.microsoft.com/office/drawing/2017/decorative" val="1"/>
+              </a:ext>
+            </a:extLst>
+          </p:cNvPr>
+          <p:cNvCxnSpPr>
+            <a:cxnSpLocks noGrp="1" noRot="1" noChangeAspect="1" noMove="1" noResize="1" noEditPoints="1" noAdjustHandles="1" noChangeArrowheads="1" noChangeShapeType="1"/>
+          </p:cNvCxnSpPr>
+          <p:nvPr>
+            <p:extLst>
+              <p:ext uri="{386F3935-93C4-4BCD-93E2-E3B085C9AB24}">
+                <p16:designElem xmlns:p16="http://schemas.microsoft.com/office/powerpoint/2015/main" val="1"/>
+              </p:ext>
+            </p:extLst>
+          </p:nvPr>
+        </p:nvCxnSpPr>
+        <p:spPr>
+          <a:xfrm>
+            <a:off x="4654296" y="1573887"/>
+            <a:ext cx="0" cy="3710227"/>
+          </a:xfrm>
+          <a:prstGeom prst="line">
+            <a:avLst/>
+          </a:prstGeom>
+          <a:ln w="19050">
+            <a:solidFill>
+              <a:srgbClr val="7F7F7F"/>
+            </a:solidFill>
+          </a:ln>
+        </p:spPr>
+        <p:style>
+          <a:lnRef idx="1">
+            <a:schemeClr val="accent1"/>
+          </a:lnRef>
+          <a:fillRef idx="0">
+            <a:schemeClr val="accent1"/>
+          </a:fillRef>
+          <a:effectRef idx="0">
+            <a:schemeClr val="accent1"/>
+          </a:effectRef>
+          <a:fontRef idx="minor">
+            <a:schemeClr val="tx1"/>
+          </a:fontRef>
+        </p:style>
+      </p:cxnSp>
+      <p:pic>
+        <p:nvPicPr>
+          <p:cNvPr id="9" name="Imagen 8" descr="Logotipo, nombre de la empresa&#10;&#10;Descripción generada automáticamente">
+            <a:extLst>
+              <a:ext uri="{FF2B5EF4-FFF2-40B4-BE49-F238E27FC236}">
+                <a16:creationId xmlns:a16="http://schemas.microsoft.com/office/drawing/2014/main" id="{B9540663-5CAB-4C8A-8941-A05FE8E568B8}"/>
+              </a:ext>
+            </a:extLst>
+          </p:cNvPr>
+          <p:cNvPicPr>
+            <a:picLocks noChangeAspect="1"/>
+          </p:cNvPicPr>
+          <p:nvPr/>
+        </p:nvPicPr>
+        <p:blipFill>
+          <a:blip r:embed="rId4">
+            <a:extLst>
+              <a:ext uri="{28A0092B-C50C-407E-A947-70E740481C1C}">
+                <a14:useLocalDpi xmlns:a14="http://schemas.microsoft.com/office/drawing/2010/main" val="0"/>
+              </a:ext>
+            </a:extLst>
+          </a:blip>
+          <a:stretch>
+            <a:fillRect/>
+          </a:stretch>
+        </p:blipFill>
+        <p:spPr>
+          <a:xfrm>
+            <a:off x="4878305" y="1492926"/>
+            <a:ext cx="6184580" cy="4026651"/>
+          </a:xfrm>
+          <a:prstGeom prst="rect">
+            <a:avLst/>
+          </a:prstGeom>
+        </p:spPr>
+      </p:pic>
+    </p:spTree>
+    <p:extLst>
+      <p:ext uri="{BB962C8B-B14F-4D97-AF65-F5344CB8AC3E}">
+        <p14:creationId xmlns:p14="http://schemas.microsoft.com/office/powerpoint/2010/main" val="2679615039"/>
+      </p:ext>
+    </p:extLst>
+  </p:cSld>
+  <p:clrMapOvr>
+    <a:masterClrMapping/>
+  </p:clrMapOvr>
+</p:sld>
+</file>
+
+<file path=ppt/slides/slide17.xml><?xml version="1.0" encoding="utf-8"?>
+<p:sld xmlns:a="http://schemas.openxmlformats.org/drawingml/2006/main" xmlns:r="http://schemas.openxmlformats.org/officeDocument/2006/relationships" xmlns:p="http://schemas.openxmlformats.org/presentationml/2006/main">
+  <p:cSld>
+    <p:bg>
+      <p:bgPr>
+        <a:solidFill>
+          <a:schemeClr val="bg1"/>
+        </a:solidFill>
+        <a:effectLst/>
+      </p:bgPr>
+    </p:bg>
+    <p:spTree>
+      <p:nvGrpSpPr>
+        <p:cNvPr id="1" name=""/>
+        <p:cNvGrpSpPr/>
+        <p:nvPr/>
+      </p:nvGrpSpPr>
+      <p:grpSpPr>
+        <a:xfrm>
+          <a:off x="0" y="0"/>
+          <a:ext cx="0" cy="0"/>
+          <a:chOff x="0" y="0"/>
+          <a:chExt cx="0" cy="0"/>
+        </a:xfrm>
+      </p:grpSpPr>
+      <p:pic>
+        <p:nvPicPr>
           <p:cNvPr id="7" name="Imagen 6" descr="Logotipo, nombre de la empresa&#10;&#10;Descripción generada automáticamente">
             <a:extLst>
               <a:ext uri="{FF2B5EF4-FFF2-40B4-BE49-F238E27FC236}">
@@ -5603,7 +5744,7 @@
 </p:sld>
 </file>
 
-<file path=ppt/slides/slide17.xml><?xml version="1.0" encoding="utf-8"?>
+<file path=ppt/slides/slide18.xml><?xml version="1.0" encoding="utf-8"?>
 <p:sld xmlns:a="http://schemas.openxmlformats.org/drawingml/2006/main" xmlns:r="http://schemas.openxmlformats.org/officeDocument/2006/relationships" xmlns:p="http://schemas.openxmlformats.org/presentationml/2006/main">
   <p:cSld>
     <p:bg>
@@ -6933,7 +7074,7 @@
 </p:sld>
 </file>
 
-<file path=ppt/slides/slide18.xml><?xml version="1.0" encoding="utf-8"?>
+<file path=ppt/slides/slide19.xml><?xml version="1.0" encoding="utf-8"?>
 <p:sld xmlns:a="http://schemas.openxmlformats.org/drawingml/2006/main" xmlns:r="http://schemas.openxmlformats.org/officeDocument/2006/relationships" xmlns:p="http://schemas.openxmlformats.org/presentationml/2006/main">
   <p:cSld>
     <p:bg>
@@ -7385,7 +7526,297 @@
 </p:sld>
 </file>
 
-<file path=ppt/slides/slide19.xml><?xml version="1.0" encoding="utf-8"?>
+<file path=ppt/slides/slide2.xml><?xml version="1.0" encoding="utf-8"?>
+<p:sld xmlns:a="http://schemas.openxmlformats.org/drawingml/2006/main" xmlns:r="http://schemas.openxmlformats.org/officeDocument/2006/relationships" xmlns:p="http://schemas.openxmlformats.org/presentationml/2006/main">
+  <p:cSld>
+    <p:bg>
+      <p:bgPr>
+        <a:solidFill>
+          <a:schemeClr val="bg1"/>
+        </a:solidFill>
+        <a:effectLst/>
+      </p:bgPr>
+    </p:bg>
+    <p:spTree>
+      <p:nvGrpSpPr>
+        <p:cNvPr id="1" name=""/>
+        <p:cNvGrpSpPr/>
+        <p:nvPr/>
+      </p:nvGrpSpPr>
+      <p:grpSpPr>
+        <a:xfrm>
+          <a:off x="0" y="0"/>
+          <a:ext cx="0" cy="0"/>
+          <a:chOff x="0" y="0"/>
+          <a:chExt cx="0" cy="0"/>
+        </a:xfrm>
+      </p:grpSpPr>
+      <p:pic>
+        <p:nvPicPr>
+          <p:cNvPr id="5" name="Imagen 4" descr="Logotipo, nombre de la empresa&#10;&#10;Descripción generada automáticamente">
+            <a:extLst>
+              <a:ext uri="{FF2B5EF4-FFF2-40B4-BE49-F238E27FC236}">
+                <a16:creationId xmlns:a16="http://schemas.microsoft.com/office/drawing/2014/main" id="{9DFB1414-30DC-4F31-8277-0792607A8735}"/>
+              </a:ext>
+            </a:extLst>
+          </p:cNvPr>
+          <p:cNvPicPr>
+            <a:picLocks noChangeAspect="1"/>
+          </p:cNvPicPr>
+          <p:nvPr/>
+        </p:nvPicPr>
+        <p:blipFill>
+          <a:blip r:embed="rId2">
+            <a:extLst>
+              <a:ext uri="{28A0092B-C50C-407E-A947-70E740481C1C}">
+                <a14:useLocalDpi xmlns:a14="http://schemas.microsoft.com/office/drawing/2010/main" val="0"/>
+              </a:ext>
+            </a:extLst>
+          </a:blip>
+          <a:stretch>
+            <a:fillRect/>
+          </a:stretch>
+        </p:blipFill>
+        <p:spPr>
+          <a:xfrm>
+            <a:off x="660400" y="642938"/>
+            <a:ext cx="2641600" cy="1731963"/>
+          </a:xfrm>
+          <a:prstGeom prst="rect">
+            <a:avLst/>
+          </a:prstGeom>
+        </p:spPr>
+      </p:pic>
+      <p:pic>
+        <p:nvPicPr>
+          <p:cNvPr id="11" name="Imagen 10" descr="Icono&#10;&#10;Descripción generada automáticamente">
+            <a:extLst>
+              <a:ext uri="{FF2B5EF4-FFF2-40B4-BE49-F238E27FC236}">
+                <a16:creationId xmlns:a16="http://schemas.microsoft.com/office/drawing/2014/main" id="{E0AAAB78-8E15-4404-B6F6-6496C2E185AD}"/>
+              </a:ext>
+            </a:extLst>
+          </p:cNvPr>
+          <p:cNvPicPr>
+            <a:picLocks noChangeAspect="1"/>
+          </p:cNvPicPr>
+          <p:nvPr/>
+        </p:nvPicPr>
+        <p:blipFill>
+          <a:blip r:embed="rId3">
+            <a:extLst>
+              <a:ext uri="{28A0092B-C50C-407E-A947-70E740481C1C}">
+                <a14:useLocalDpi xmlns:a14="http://schemas.microsoft.com/office/drawing/2010/main" val="0"/>
+              </a:ext>
+            </a:extLst>
+          </a:blip>
+          <a:stretch>
+            <a:fillRect/>
+          </a:stretch>
+        </p:blipFill>
+        <p:spPr>
+          <a:xfrm>
+            <a:off x="3376613" y="642938"/>
+            <a:ext cx="3070225" cy="1731963"/>
+          </a:xfrm>
+          <a:prstGeom prst="rect">
+            <a:avLst/>
+          </a:prstGeom>
+        </p:spPr>
+      </p:pic>
+      <p:pic>
+        <p:nvPicPr>
+          <p:cNvPr id="13" name="Imagen 12" descr="Icono&#10;&#10;Descripción generada automáticamente">
+            <a:extLst>
+              <a:ext uri="{FF2B5EF4-FFF2-40B4-BE49-F238E27FC236}">
+                <a16:creationId xmlns:a16="http://schemas.microsoft.com/office/drawing/2014/main" id="{0099A748-0FA1-4410-80D8-565C4031D320}"/>
+              </a:ext>
+            </a:extLst>
+          </p:cNvPr>
+          <p:cNvPicPr>
+            <a:picLocks noChangeAspect="1"/>
+          </p:cNvPicPr>
+          <p:nvPr/>
+        </p:nvPicPr>
+        <p:blipFill>
+          <a:blip r:embed="rId4">
+            <a:extLst>
+              <a:ext uri="{28A0092B-C50C-407E-A947-70E740481C1C}">
+                <a14:useLocalDpi xmlns:a14="http://schemas.microsoft.com/office/drawing/2010/main" val="0"/>
+              </a:ext>
+            </a:extLst>
+          </a:blip>
+          <a:stretch>
+            <a:fillRect/>
+          </a:stretch>
+        </p:blipFill>
+        <p:spPr>
+          <a:xfrm>
+            <a:off x="6521450" y="642938"/>
+            <a:ext cx="5008563" cy="1731963"/>
+          </a:xfrm>
+          <a:prstGeom prst="rect">
+            <a:avLst/>
+          </a:prstGeom>
+        </p:spPr>
+      </p:pic>
+      <p:pic>
+        <p:nvPicPr>
+          <p:cNvPr id="7" name="Imagen 6" descr="Icono&#10;&#10;Descripción generada automáticamente">
+            <a:extLst>
+              <a:ext uri="{FF2B5EF4-FFF2-40B4-BE49-F238E27FC236}">
+                <a16:creationId xmlns:a16="http://schemas.microsoft.com/office/drawing/2014/main" id="{B6617D36-D867-4434-8390-642D1093207C}"/>
+              </a:ext>
+            </a:extLst>
+          </p:cNvPr>
+          <p:cNvPicPr>
+            <a:picLocks noChangeAspect="1"/>
+          </p:cNvPicPr>
+          <p:nvPr/>
+        </p:nvPicPr>
+        <p:blipFill>
+          <a:blip r:embed="rId5">
+            <a:extLst>
+              <a:ext uri="{28A0092B-C50C-407E-A947-70E740481C1C}">
+                <a14:useLocalDpi xmlns:a14="http://schemas.microsoft.com/office/drawing/2010/main" val="0"/>
+              </a:ext>
+            </a:extLst>
+          </a:blip>
+          <a:stretch>
+            <a:fillRect/>
+          </a:stretch>
+        </p:blipFill>
+        <p:spPr>
+          <a:xfrm>
+            <a:off x="660400" y="2447925"/>
+            <a:ext cx="7585075" cy="1897063"/>
+          </a:xfrm>
+          <a:prstGeom prst="rect">
+            <a:avLst/>
+          </a:prstGeom>
+        </p:spPr>
+      </p:pic>
+      <p:pic>
+        <p:nvPicPr>
+          <p:cNvPr id="3" name="Imagen 2" descr="Logotipo&#10;&#10;Descripción generada automáticamente">
+            <a:extLst>
+              <a:ext uri="{FF2B5EF4-FFF2-40B4-BE49-F238E27FC236}">
+                <a16:creationId xmlns:a16="http://schemas.microsoft.com/office/drawing/2014/main" id="{7A48E5F6-40C6-45A6-9B34-59E7C4BB7601}"/>
+              </a:ext>
+            </a:extLst>
+          </p:cNvPr>
+          <p:cNvPicPr>
+            <a:picLocks noChangeAspect="1"/>
+          </p:cNvPicPr>
+          <p:nvPr/>
+        </p:nvPicPr>
+        <p:blipFill>
+          <a:blip r:embed="rId6">
+            <a:extLst>
+              <a:ext uri="{28A0092B-C50C-407E-A947-70E740481C1C}">
+                <a14:useLocalDpi xmlns:a14="http://schemas.microsoft.com/office/drawing/2010/main" val="0"/>
+              </a:ext>
+            </a:extLst>
+          </a:blip>
+          <a:stretch>
+            <a:fillRect/>
+          </a:stretch>
+        </p:blipFill>
+        <p:spPr>
+          <a:xfrm>
+            <a:off x="8320088" y="2447925"/>
+            <a:ext cx="3209925" cy="1897063"/>
+          </a:xfrm>
+          <a:prstGeom prst="rect">
+            <a:avLst/>
+          </a:prstGeom>
+        </p:spPr>
+      </p:pic>
+      <p:pic>
+        <p:nvPicPr>
+          <p:cNvPr id="9" name="Imagen 8" descr="Icono&#10;&#10;Descripción generada automáticamente">
+            <a:extLst>
+              <a:ext uri="{FF2B5EF4-FFF2-40B4-BE49-F238E27FC236}">
+                <a16:creationId xmlns:a16="http://schemas.microsoft.com/office/drawing/2014/main" id="{F70D137B-FFF2-4DB8-8C02-6850D3B184A8}"/>
+              </a:ext>
+            </a:extLst>
+          </p:cNvPr>
+          <p:cNvPicPr>
+            <a:picLocks noChangeAspect="1"/>
+          </p:cNvPicPr>
+          <p:nvPr/>
+        </p:nvPicPr>
+        <p:blipFill>
+          <a:blip r:embed="rId7">
+            <a:extLst>
+              <a:ext uri="{28A0092B-C50C-407E-A947-70E740481C1C}">
+                <a14:useLocalDpi xmlns:a14="http://schemas.microsoft.com/office/drawing/2010/main" val="0"/>
+              </a:ext>
+            </a:extLst>
+          </a:blip>
+          <a:stretch>
+            <a:fillRect/>
+          </a:stretch>
+        </p:blipFill>
+        <p:spPr>
+          <a:xfrm>
+            <a:off x="660400" y="4418013"/>
+            <a:ext cx="3476625" cy="1795463"/>
+          </a:xfrm>
+          <a:prstGeom prst="rect">
+            <a:avLst/>
+          </a:prstGeom>
+        </p:spPr>
+      </p:pic>
+      <p:pic>
+        <p:nvPicPr>
+          <p:cNvPr id="10" name="Imagen 9" descr="Un dibujo de un perro&#10;&#10;Descripción generada automáticamente con confianza media">
+            <a:extLst>
+              <a:ext uri="{FF2B5EF4-FFF2-40B4-BE49-F238E27FC236}">
+                <a16:creationId xmlns:a16="http://schemas.microsoft.com/office/drawing/2014/main" id="{A7EA69AA-C1CD-44C8-B584-F616B3218CC4}"/>
+              </a:ext>
+            </a:extLst>
+          </p:cNvPr>
+          <p:cNvPicPr>
+            <a:picLocks noChangeAspect="1"/>
+          </p:cNvPicPr>
+          <p:nvPr/>
+        </p:nvPicPr>
+        <p:blipFill>
+          <a:blip r:embed="rId8">
+            <a:extLst>
+              <a:ext uri="{28A0092B-C50C-407E-A947-70E740481C1C}">
+                <a14:useLocalDpi xmlns:a14="http://schemas.microsoft.com/office/drawing/2010/main" val="0"/>
+              </a:ext>
+            </a:extLst>
+          </a:blip>
+          <a:stretch>
+            <a:fillRect/>
+          </a:stretch>
+        </p:blipFill>
+        <p:spPr>
+          <a:xfrm>
+            <a:off x="4211638" y="4418013"/>
+            <a:ext cx="7318375" cy="1795463"/>
+          </a:xfrm>
+          <a:prstGeom prst="rect">
+            <a:avLst/>
+          </a:prstGeom>
+        </p:spPr>
+      </p:pic>
+    </p:spTree>
+    <p:extLst>
+      <p:ext uri="{BB962C8B-B14F-4D97-AF65-F5344CB8AC3E}">
+        <p14:creationId xmlns:p14="http://schemas.microsoft.com/office/powerpoint/2010/main" val="1543100180"/>
+      </p:ext>
+    </p:extLst>
+  </p:cSld>
+  <p:clrMapOvr>
+    <a:masterClrMapping/>
+  </p:clrMapOvr>
+</p:sld>
+</file>
+
+<file path=ppt/slides/slide20.xml><?xml version="1.0" encoding="utf-8"?>
 <p:sld xmlns:a="http://schemas.openxmlformats.org/drawingml/2006/main" xmlns:r="http://schemas.openxmlformats.org/officeDocument/2006/relationships" xmlns:p="http://schemas.openxmlformats.org/presentationml/2006/main">
   <p:cSld>
     <p:bg>
@@ -7970,297 +8401,7 @@
 </p:sld>
 </file>
 
-<file path=ppt/slides/slide2.xml><?xml version="1.0" encoding="utf-8"?>
-<p:sld xmlns:a="http://schemas.openxmlformats.org/drawingml/2006/main" xmlns:r="http://schemas.openxmlformats.org/officeDocument/2006/relationships" xmlns:p="http://schemas.openxmlformats.org/presentationml/2006/main">
-  <p:cSld>
-    <p:bg>
-      <p:bgPr>
-        <a:solidFill>
-          <a:schemeClr val="bg1"/>
-        </a:solidFill>
-        <a:effectLst/>
-      </p:bgPr>
-    </p:bg>
-    <p:spTree>
-      <p:nvGrpSpPr>
-        <p:cNvPr id="1" name=""/>
-        <p:cNvGrpSpPr/>
-        <p:nvPr/>
-      </p:nvGrpSpPr>
-      <p:grpSpPr>
-        <a:xfrm>
-          <a:off x="0" y="0"/>
-          <a:ext cx="0" cy="0"/>
-          <a:chOff x="0" y="0"/>
-          <a:chExt cx="0" cy="0"/>
-        </a:xfrm>
-      </p:grpSpPr>
-      <p:pic>
-        <p:nvPicPr>
-          <p:cNvPr id="5" name="Imagen 4" descr="Logotipo, nombre de la empresa&#10;&#10;Descripción generada automáticamente">
-            <a:extLst>
-              <a:ext uri="{FF2B5EF4-FFF2-40B4-BE49-F238E27FC236}">
-                <a16:creationId xmlns:a16="http://schemas.microsoft.com/office/drawing/2014/main" id="{9DFB1414-30DC-4F31-8277-0792607A8735}"/>
-              </a:ext>
-            </a:extLst>
-          </p:cNvPr>
-          <p:cNvPicPr>
-            <a:picLocks noChangeAspect="1"/>
-          </p:cNvPicPr>
-          <p:nvPr/>
-        </p:nvPicPr>
-        <p:blipFill>
-          <a:blip r:embed="rId2">
-            <a:extLst>
-              <a:ext uri="{28A0092B-C50C-407E-A947-70E740481C1C}">
-                <a14:useLocalDpi xmlns:a14="http://schemas.microsoft.com/office/drawing/2010/main" val="0"/>
-              </a:ext>
-            </a:extLst>
-          </a:blip>
-          <a:stretch>
-            <a:fillRect/>
-          </a:stretch>
-        </p:blipFill>
-        <p:spPr>
-          <a:xfrm>
-            <a:off x="660400" y="642938"/>
-            <a:ext cx="2641600" cy="1731963"/>
-          </a:xfrm>
-          <a:prstGeom prst="rect">
-            <a:avLst/>
-          </a:prstGeom>
-        </p:spPr>
-      </p:pic>
-      <p:pic>
-        <p:nvPicPr>
-          <p:cNvPr id="11" name="Imagen 10" descr="Icono&#10;&#10;Descripción generada automáticamente">
-            <a:extLst>
-              <a:ext uri="{FF2B5EF4-FFF2-40B4-BE49-F238E27FC236}">
-                <a16:creationId xmlns:a16="http://schemas.microsoft.com/office/drawing/2014/main" id="{E0AAAB78-8E15-4404-B6F6-6496C2E185AD}"/>
-              </a:ext>
-            </a:extLst>
-          </p:cNvPr>
-          <p:cNvPicPr>
-            <a:picLocks noChangeAspect="1"/>
-          </p:cNvPicPr>
-          <p:nvPr/>
-        </p:nvPicPr>
-        <p:blipFill>
-          <a:blip r:embed="rId3">
-            <a:extLst>
-              <a:ext uri="{28A0092B-C50C-407E-A947-70E740481C1C}">
-                <a14:useLocalDpi xmlns:a14="http://schemas.microsoft.com/office/drawing/2010/main" val="0"/>
-              </a:ext>
-            </a:extLst>
-          </a:blip>
-          <a:stretch>
-            <a:fillRect/>
-          </a:stretch>
-        </p:blipFill>
-        <p:spPr>
-          <a:xfrm>
-            <a:off x="3376613" y="642938"/>
-            <a:ext cx="3070225" cy="1731963"/>
-          </a:xfrm>
-          <a:prstGeom prst="rect">
-            <a:avLst/>
-          </a:prstGeom>
-        </p:spPr>
-      </p:pic>
-      <p:pic>
-        <p:nvPicPr>
-          <p:cNvPr id="13" name="Imagen 12" descr="Icono&#10;&#10;Descripción generada automáticamente">
-            <a:extLst>
-              <a:ext uri="{FF2B5EF4-FFF2-40B4-BE49-F238E27FC236}">
-                <a16:creationId xmlns:a16="http://schemas.microsoft.com/office/drawing/2014/main" id="{0099A748-0FA1-4410-80D8-565C4031D320}"/>
-              </a:ext>
-            </a:extLst>
-          </p:cNvPr>
-          <p:cNvPicPr>
-            <a:picLocks noChangeAspect="1"/>
-          </p:cNvPicPr>
-          <p:nvPr/>
-        </p:nvPicPr>
-        <p:blipFill>
-          <a:blip r:embed="rId4">
-            <a:extLst>
-              <a:ext uri="{28A0092B-C50C-407E-A947-70E740481C1C}">
-                <a14:useLocalDpi xmlns:a14="http://schemas.microsoft.com/office/drawing/2010/main" val="0"/>
-              </a:ext>
-            </a:extLst>
-          </a:blip>
-          <a:stretch>
-            <a:fillRect/>
-          </a:stretch>
-        </p:blipFill>
-        <p:spPr>
-          <a:xfrm>
-            <a:off x="6521450" y="642938"/>
-            <a:ext cx="5008563" cy="1731963"/>
-          </a:xfrm>
-          <a:prstGeom prst="rect">
-            <a:avLst/>
-          </a:prstGeom>
-        </p:spPr>
-      </p:pic>
-      <p:pic>
-        <p:nvPicPr>
-          <p:cNvPr id="7" name="Imagen 6" descr="Icono&#10;&#10;Descripción generada automáticamente">
-            <a:extLst>
-              <a:ext uri="{FF2B5EF4-FFF2-40B4-BE49-F238E27FC236}">
-                <a16:creationId xmlns:a16="http://schemas.microsoft.com/office/drawing/2014/main" id="{B6617D36-D867-4434-8390-642D1093207C}"/>
-              </a:ext>
-            </a:extLst>
-          </p:cNvPr>
-          <p:cNvPicPr>
-            <a:picLocks noChangeAspect="1"/>
-          </p:cNvPicPr>
-          <p:nvPr/>
-        </p:nvPicPr>
-        <p:blipFill>
-          <a:blip r:embed="rId5">
-            <a:extLst>
-              <a:ext uri="{28A0092B-C50C-407E-A947-70E740481C1C}">
-                <a14:useLocalDpi xmlns:a14="http://schemas.microsoft.com/office/drawing/2010/main" val="0"/>
-              </a:ext>
-            </a:extLst>
-          </a:blip>
-          <a:stretch>
-            <a:fillRect/>
-          </a:stretch>
-        </p:blipFill>
-        <p:spPr>
-          <a:xfrm>
-            <a:off x="660400" y="2447925"/>
-            <a:ext cx="7585075" cy="1897063"/>
-          </a:xfrm>
-          <a:prstGeom prst="rect">
-            <a:avLst/>
-          </a:prstGeom>
-        </p:spPr>
-      </p:pic>
-      <p:pic>
-        <p:nvPicPr>
-          <p:cNvPr id="3" name="Imagen 2" descr="Logotipo&#10;&#10;Descripción generada automáticamente">
-            <a:extLst>
-              <a:ext uri="{FF2B5EF4-FFF2-40B4-BE49-F238E27FC236}">
-                <a16:creationId xmlns:a16="http://schemas.microsoft.com/office/drawing/2014/main" id="{7A48E5F6-40C6-45A6-9B34-59E7C4BB7601}"/>
-              </a:ext>
-            </a:extLst>
-          </p:cNvPr>
-          <p:cNvPicPr>
-            <a:picLocks noChangeAspect="1"/>
-          </p:cNvPicPr>
-          <p:nvPr/>
-        </p:nvPicPr>
-        <p:blipFill>
-          <a:blip r:embed="rId6">
-            <a:extLst>
-              <a:ext uri="{28A0092B-C50C-407E-A947-70E740481C1C}">
-                <a14:useLocalDpi xmlns:a14="http://schemas.microsoft.com/office/drawing/2010/main" val="0"/>
-              </a:ext>
-            </a:extLst>
-          </a:blip>
-          <a:stretch>
-            <a:fillRect/>
-          </a:stretch>
-        </p:blipFill>
-        <p:spPr>
-          <a:xfrm>
-            <a:off x="8320088" y="2447925"/>
-            <a:ext cx="3209925" cy="1897063"/>
-          </a:xfrm>
-          <a:prstGeom prst="rect">
-            <a:avLst/>
-          </a:prstGeom>
-        </p:spPr>
-      </p:pic>
-      <p:pic>
-        <p:nvPicPr>
-          <p:cNvPr id="9" name="Imagen 8" descr="Icono&#10;&#10;Descripción generada automáticamente">
-            <a:extLst>
-              <a:ext uri="{FF2B5EF4-FFF2-40B4-BE49-F238E27FC236}">
-                <a16:creationId xmlns:a16="http://schemas.microsoft.com/office/drawing/2014/main" id="{F70D137B-FFF2-4DB8-8C02-6850D3B184A8}"/>
-              </a:ext>
-            </a:extLst>
-          </p:cNvPr>
-          <p:cNvPicPr>
-            <a:picLocks noChangeAspect="1"/>
-          </p:cNvPicPr>
-          <p:nvPr/>
-        </p:nvPicPr>
-        <p:blipFill>
-          <a:blip r:embed="rId7">
-            <a:extLst>
-              <a:ext uri="{28A0092B-C50C-407E-A947-70E740481C1C}">
-                <a14:useLocalDpi xmlns:a14="http://schemas.microsoft.com/office/drawing/2010/main" val="0"/>
-              </a:ext>
-            </a:extLst>
-          </a:blip>
-          <a:stretch>
-            <a:fillRect/>
-          </a:stretch>
-        </p:blipFill>
-        <p:spPr>
-          <a:xfrm>
-            <a:off x="660400" y="4418013"/>
-            <a:ext cx="3476625" cy="1795463"/>
-          </a:xfrm>
-          <a:prstGeom prst="rect">
-            <a:avLst/>
-          </a:prstGeom>
-        </p:spPr>
-      </p:pic>
-      <p:pic>
-        <p:nvPicPr>
-          <p:cNvPr id="10" name="Imagen 9" descr="Un dibujo de un perro&#10;&#10;Descripción generada automáticamente con confianza media">
-            <a:extLst>
-              <a:ext uri="{FF2B5EF4-FFF2-40B4-BE49-F238E27FC236}">
-                <a16:creationId xmlns:a16="http://schemas.microsoft.com/office/drawing/2014/main" id="{A7EA69AA-C1CD-44C8-B584-F616B3218CC4}"/>
-              </a:ext>
-            </a:extLst>
-          </p:cNvPr>
-          <p:cNvPicPr>
-            <a:picLocks noChangeAspect="1"/>
-          </p:cNvPicPr>
-          <p:nvPr/>
-        </p:nvPicPr>
-        <p:blipFill>
-          <a:blip r:embed="rId8">
-            <a:extLst>
-              <a:ext uri="{28A0092B-C50C-407E-A947-70E740481C1C}">
-                <a14:useLocalDpi xmlns:a14="http://schemas.microsoft.com/office/drawing/2010/main" val="0"/>
-              </a:ext>
-            </a:extLst>
-          </a:blip>
-          <a:stretch>
-            <a:fillRect/>
-          </a:stretch>
-        </p:blipFill>
-        <p:spPr>
-          <a:xfrm>
-            <a:off x="4211638" y="4418013"/>
-            <a:ext cx="7318375" cy="1795463"/>
-          </a:xfrm>
-          <a:prstGeom prst="rect">
-            <a:avLst/>
-          </a:prstGeom>
-        </p:spPr>
-      </p:pic>
-    </p:spTree>
-    <p:extLst>
-      <p:ext uri="{BB962C8B-B14F-4D97-AF65-F5344CB8AC3E}">
-        <p14:creationId xmlns:p14="http://schemas.microsoft.com/office/powerpoint/2010/main" val="1543100180"/>
-      </p:ext>
-    </p:extLst>
-  </p:cSld>
-  <p:clrMapOvr>
-    <a:masterClrMapping/>
-  </p:clrMapOvr>
-</p:sld>
-</file>
-
-<file path=ppt/slides/slide20.xml><?xml version="1.0" encoding="utf-8"?>
+<file path=ppt/slides/slide21.xml><?xml version="1.0" encoding="utf-8"?>
 <p:sld xmlns:a="http://schemas.openxmlformats.org/drawingml/2006/main" xmlns:r="http://schemas.openxmlformats.org/officeDocument/2006/relationships" xmlns:p="http://schemas.openxmlformats.org/presentationml/2006/main">
   <p:cSld>
     <p:bg>

</xml_diff>

<commit_message>
cambiando imagen para movil
</commit_message>
<xml_diff>
--- a/src/assets/Tecnologias.pptx
+++ b/src/assets/Tecnologias.pptx
@@ -283,7 +283,7 @@
           <a:p>
             <a:fld id="{9E11D292-9858-43A2-94EF-E1E63D9E27EF}" type="datetimeFigureOut">
               <a:rPr lang="es-419" smtClean="0"/>
-              <a:t>6/8/2022</a:t>
+              <a:t>7/8/2022</a:t>
             </a:fld>
             <a:endParaRPr lang="es-419"/>
           </a:p>
@@ -483,7 +483,7 @@
           <a:p>
             <a:fld id="{9E11D292-9858-43A2-94EF-E1E63D9E27EF}" type="datetimeFigureOut">
               <a:rPr lang="es-419" smtClean="0"/>
-              <a:t>6/8/2022</a:t>
+              <a:t>7/8/2022</a:t>
             </a:fld>
             <a:endParaRPr lang="es-419"/>
           </a:p>
@@ -693,7 +693,7 @@
           <a:p>
             <a:fld id="{9E11D292-9858-43A2-94EF-E1E63D9E27EF}" type="datetimeFigureOut">
               <a:rPr lang="es-419" smtClean="0"/>
-              <a:t>6/8/2022</a:t>
+              <a:t>7/8/2022</a:t>
             </a:fld>
             <a:endParaRPr lang="es-419"/>
           </a:p>
@@ -893,7 +893,7 @@
           <a:p>
             <a:fld id="{9E11D292-9858-43A2-94EF-E1E63D9E27EF}" type="datetimeFigureOut">
               <a:rPr lang="es-419" smtClean="0"/>
-              <a:t>6/8/2022</a:t>
+              <a:t>7/8/2022</a:t>
             </a:fld>
             <a:endParaRPr lang="es-419"/>
           </a:p>
@@ -1169,7 +1169,7 @@
           <a:p>
             <a:fld id="{9E11D292-9858-43A2-94EF-E1E63D9E27EF}" type="datetimeFigureOut">
               <a:rPr lang="es-419" smtClean="0"/>
-              <a:t>6/8/2022</a:t>
+              <a:t>7/8/2022</a:t>
             </a:fld>
             <a:endParaRPr lang="es-419"/>
           </a:p>
@@ -1437,7 +1437,7 @@
           <a:p>
             <a:fld id="{9E11D292-9858-43A2-94EF-E1E63D9E27EF}" type="datetimeFigureOut">
               <a:rPr lang="es-419" smtClean="0"/>
-              <a:t>6/8/2022</a:t>
+              <a:t>7/8/2022</a:t>
             </a:fld>
             <a:endParaRPr lang="es-419"/>
           </a:p>
@@ -1852,7 +1852,7 @@
           <a:p>
             <a:fld id="{9E11D292-9858-43A2-94EF-E1E63D9E27EF}" type="datetimeFigureOut">
               <a:rPr lang="es-419" smtClean="0"/>
-              <a:t>6/8/2022</a:t>
+              <a:t>7/8/2022</a:t>
             </a:fld>
             <a:endParaRPr lang="es-419"/>
           </a:p>
@@ -1994,7 +1994,7 @@
           <a:p>
             <a:fld id="{9E11D292-9858-43A2-94EF-E1E63D9E27EF}" type="datetimeFigureOut">
               <a:rPr lang="es-419" smtClean="0"/>
-              <a:t>6/8/2022</a:t>
+              <a:t>7/8/2022</a:t>
             </a:fld>
             <a:endParaRPr lang="es-419"/>
           </a:p>
@@ -2107,7 +2107,7 @@
           <a:p>
             <a:fld id="{9E11D292-9858-43A2-94EF-E1E63D9E27EF}" type="datetimeFigureOut">
               <a:rPr lang="es-419" smtClean="0"/>
-              <a:t>6/8/2022</a:t>
+              <a:t>7/8/2022</a:t>
             </a:fld>
             <a:endParaRPr lang="es-419"/>
           </a:p>
@@ -2420,7 +2420,7 @@
           <a:p>
             <a:fld id="{9E11D292-9858-43A2-94EF-E1E63D9E27EF}" type="datetimeFigureOut">
               <a:rPr lang="es-419" smtClean="0"/>
-              <a:t>6/8/2022</a:t>
+              <a:t>7/8/2022</a:t>
             </a:fld>
             <a:endParaRPr lang="es-419"/>
           </a:p>
@@ -2709,7 +2709,7 @@
           <a:p>
             <a:fld id="{9E11D292-9858-43A2-94EF-E1E63D9E27EF}" type="datetimeFigureOut">
               <a:rPr lang="es-419" smtClean="0"/>
-              <a:t>6/8/2022</a:t>
+              <a:t>7/8/2022</a:t>
             </a:fld>
             <a:endParaRPr lang="es-419"/>
           </a:p>
@@ -2952,7 +2952,7 @@
           <a:p>
             <a:fld id="{9E11D292-9858-43A2-94EF-E1E63D9E27EF}" type="datetimeFigureOut">
               <a:rPr lang="es-419" smtClean="0"/>
-              <a:t>6/8/2022</a:t>
+              <a:t>7/8/2022</a:t>
             </a:fld>
             <a:endParaRPr lang="es-419"/>
           </a:p>

</xml_diff>